<commit_message>
more slides on different use cases
</commit_message>
<xml_diff>
--- a/ietf105-masque-side-meeting.pptx
+++ b/ietf105-masque-side-meeting.pptx
@@ -5,42 +5,47 @@
     <p:sldMasterId id="2147483660" r:id="rId4"/>
   </p:sldMasterIdLst>
   <p:notesMasterIdLst>
-    <p:notesMasterId r:id="rId12"/>
+    <p:notesMasterId r:id="rId17"/>
   </p:notesMasterIdLst>
   <p:handoutMasterIdLst>
-    <p:handoutMasterId r:id="rId13"/>
+    <p:handoutMasterId r:id="rId18"/>
   </p:handoutMasterIdLst>
   <p:sldIdLst>
     <p:sldId id="276" r:id="rId5"/>
     <p:sldId id="282" r:id="rId6"/>
     <p:sldId id="283" r:id="rId7"/>
     <p:sldId id="286" r:id="rId8"/>
-    <p:sldId id="284" r:id="rId9"/>
-    <p:sldId id="285" r:id="rId10"/>
-    <p:sldId id="280" r:id="rId11"/>
+    <p:sldId id="260" r:id="rId9"/>
+    <p:sldId id="261" r:id="rId10"/>
+    <p:sldId id="262" r:id="rId11"/>
+    <p:sldId id="263" r:id="rId12"/>
+    <p:sldId id="264" r:id="rId13"/>
+    <p:sldId id="285" r:id="rId14"/>
+    <p:sldId id="280" r:id="rId15"/>
+    <p:sldId id="284" r:id="rId16"/>
   </p:sldIdLst>
   <p:sldSz cx="12192000" cy="6858000"/>
   <p:notesSz cx="6858000" cy="9144000"/>
   <p:embeddedFontLst>
     <p:embeddedFont>
       <p:font typeface="Calibri" panose="020F0502020204030204" pitchFamily="34" charset="0"/>
-      <p:regular r:id="rId14"/>
-      <p:bold r:id="rId15"/>
-      <p:italic r:id="rId16"/>
-      <p:boldItalic r:id="rId17"/>
+      <p:regular r:id="rId19"/>
+      <p:bold r:id="rId20"/>
+      <p:italic r:id="rId21"/>
+      <p:boldItalic r:id="rId22"/>
     </p:embeddedFont>
     <p:embeddedFont>
       <p:font typeface="Ericsson Hilda" pitchFamily="2" charset="0"/>
-      <p:regular r:id="rId18"/>
-      <p:bold r:id="rId19"/>
+      <p:regular r:id="rId23"/>
+      <p:bold r:id="rId24"/>
     </p:embeddedFont>
     <p:embeddedFont>
       <p:font typeface="Ericsson Hilda Light" pitchFamily="2" charset="0"/>
-      <p:regular r:id="rId20"/>
+      <p:regular r:id="rId25"/>
     </p:embeddedFont>
     <p:embeddedFont>
       <p:font typeface="Ericsson Technical Icons" pitchFamily="2" charset="0"/>
-      <p:regular r:id="rId21"/>
+      <p:regular r:id="rId26"/>
     </p:embeddedFont>
   </p:embeddedFontLst>
   <p:defaultTextStyle>
@@ -10548,6 +10553,149 @@
 </p:sldLayout>
 </file>
 
+<file path=ppt/slideLayouts/slideLayout46.xml><?xml version="1.0" encoding="utf-8"?>
+<p:sldLayout xmlns:a="http://schemas.openxmlformats.org/drawingml/2006/main" xmlns:r="http://schemas.openxmlformats.org/officeDocument/2006/relationships" xmlns:p="http://schemas.openxmlformats.org/presentationml/2006/main" type="tx">
+  <p:cSld name="1_Title and 1 column">
+    <p:spTree>
+      <p:nvGrpSpPr>
+        <p:cNvPr id="1" name=""/>
+        <p:cNvGrpSpPr/>
+        <p:nvPr/>
+      </p:nvGrpSpPr>
+      <p:grpSpPr>
+        <a:xfrm>
+          <a:off x="0" y="0"/>
+          <a:ext cx="0" cy="0"/>
+          <a:chOff x="0" y="0"/>
+          <a:chExt cx="0" cy="0"/>
+        </a:xfrm>
+      </p:grpSpPr>
+      <p:sp>
+        <p:nvSpPr>
+          <p:cNvPr id="243" name="Title Text"/>
+          <p:cNvSpPr txBox="1">
+            <a:spLocks noGrp="1"/>
+          </p:cNvSpPr>
+          <p:nvPr>
+            <p:ph type="title"/>
+          </p:nvPr>
+        </p:nvSpPr>
+        <p:spPr>
+          <a:xfrm>
+            <a:off x="479425" y="476250"/>
+            <a:ext cx="8353426" cy="1081088"/>
+          </a:xfrm>
+          <a:prstGeom prst="rect">
+            <a:avLst/>
+          </a:prstGeom>
+        </p:spPr>
+        <p:txBody>
+          <a:bodyPr>
+            <a:normAutofit/>
+          </a:bodyPr>
+          <a:lstStyle/>
+          <a:p>
+            <a:r>
+              <a:t>Title Text</a:t>
+            </a:r>
+          </a:p>
+        </p:txBody>
+      </p:sp>
+      <p:sp>
+        <p:nvSpPr>
+          <p:cNvPr id="244" name="Body Level One…"/>
+          <p:cNvSpPr txBox="1">
+            <a:spLocks noGrp="1"/>
+          </p:cNvSpPr>
+          <p:nvPr>
+            <p:ph type="body" idx="1"/>
+          </p:nvPr>
+        </p:nvSpPr>
+        <p:spPr>
+          <a:xfrm>
+            <a:off x="479425" y="1844675"/>
+            <a:ext cx="11233150" cy="4392613"/>
+          </a:xfrm>
+          <a:prstGeom prst="rect">
+            <a:avLst/>
+          </a:prstGeom>
+        </p:spPr>
+        <p:txBody>
+          <a:bodyPr>
+            <a:normAutofit/>
+          </a:bodyPr>
+          <a:lstStyle/>
+          <a:p>
+            <a:r>
+              <a:t>Body Level One</a:t>
+            </a:r>
+          </a:p>
+          <a:p>
+            <a:pPr lvl="1"/>
+            <a:r>
+              <a:t>Body Level Two</a:t>
+            </a:r>
+          </a:p>
+          <a:p>
+            <a:pPr lvl="2"/>
+            <a:r>
+              <a:t>Body Level Three</a:t>
+            </a:r>
+          </a:p>
+          <a:p>
+            <a:pPr lvl="3"/>
+            <a:r>
+              <a:t>Body Level Four</a:t>
+            </a:r>
+          </a:p>
+          <a:p>
+            <a:pPr lvl="4"/>
+            <a:r>
+              <a:t>Body Level Five</a:t>
+            </a:r>
+          </a:p>
+        </p:txBody>
+      </p:sp>
+      <p:sp>
+        <p:nvSpPr>
+          <p:cNvPr id="245" name="Slide Number"/>
+          <p:cNvSpPr txBox="1">
+            <a:spLocks noGrp="1"/>
+          </p:cNvSpPr>
+          <p:nvPr>
+            <p:ph type="sldNum" sz="quarter" idx="2"/>
+          </p:nvPr>
+        </p:nvSpPr>
+        <p:spPr>
+          <a:prstGeom prst="rect">
+            <a:avLst/>
+          </a:prstGeom>
+        </p:spPr>
+        <p:txBody>
+          <a:bodyPr/>
+          <a:lstStyle/>
+          <a:p>
+            <a:fld id="{86CB4B4D-7CA3-9044-876B-883B54F8677D}" type="slidenum">
+              <a:t>‹#›</a:t>
+            </a:fld>
+            <a:endParaRPr/>
+          </a:p>
+        </p:txBody>
+      </p:sp>
+    </p:spTree>
+    <p:extLst>
+      <p:ext uri="{BB962C8B-B14F-4D97-AF65-F5344CB8AC3E}">
+        <p14:creationId xmlns:p14="http://schemas.microsoft.com/office/powerpoint/2010/main" val="2741391901"/>
+      </p:ext>
+    </p:extLst>
+  </p:cSld>
+  <p:clrMapOvr>
+    <a:masterClrMapping/>
+  </p:clrMapOvr>
+  <p:transition spd="med"/>
+</p:sldLayout>
+</file>
+
 <file path=ppt/slideLayouts/slideLayout5.xml><?xml version="1.0" encoding="utf-8"?>
 <p:sldLayout xmlns:a="http://schemas.openxmlformats.org/drawingml/2006/main" xmlns:r="http://schemas.openxmlformats.org/officeDocument/2006/relationships" xmlns:p="http://schemas.openxmlformats.org/presentationml/2006/main" showMasterSp="0" preserve="1" userDrawn="1">
   <p:cSld name="Keynote Cover Page w. Bright Photo">
@@ -12087,13 +12235,13 @@
           <p:nvPr userDrawn="1"/>
         </p:nvPicPr>
         <p:blipFill>
-          <a:blip r:embed="rId47">
+          <a:blip r:embed="rId48">
             <a:extLst>
               <a:ext uri="{28A0092B-C50C-407E-A947-70E740481C1C}">
                 <a14:useLocalDpi xmlns:a14="http://schemas.microsoft.com/office/drawing/2010/main" val="0"/>
               </a:ext>
               <a:ext uri="{96DAC541-7B7A-43D3-8B79-37D633B846F1}">
-                <asvg:svgBlip xmlns:asvg="http://schemas.microsoft.com/office/drawing/2016/SVG/main" r:embed="rId48"/>
+                <asvg:svgBlip xmlns:asvg="http://schemas.microsoft.com/office/drawing/2016/SVG/main" r:embed="rId49"/>
               </a:ext>
             </a:extLst>
           </a:blip>
@@ -12165,6 +12313,7 @@
     <p:sldLayoutId id="2147483692" r:id="rId43"/>
     <p:sldLayoutId id="2147483704" r:id="rId44"/>
     <p:sldLayoutId id="2147483705" r:id="rId45"/>
+    <p:sldLayoutId id="2147483706" r:id="rId46"/>
   </p:sldLayoutIdLst>
   <p:txStyles>
     <p:titleStyle>
@@ -12846,6 +12995,538 @@
     <p:extLst>
       <p:ext uri="{BB962C8B-B14F-4D97-AF65-F5344CB8AC3E}">
         <p14:creationId xmlns:p14="http://schemas.microsoft.com/office/powerpoint/2010/main" val="730652743"/>
+      </p:ext>
+    </p:extLst>
+  </p:cSld>
+  <p:clrMapOvr>
+    <a:masterClrMapping/>
+  </p:clrMapOvr>
+</p:sld>
+</file>
+
+<file path=ppt/slides/slide10.xml><?xml version="1.0" encoding="utf-8"?>
+<p:sld xmlns:a="http://schemas.openxmlformats.org/drawingml/2006/main" xmlns:r="http://schemas.openxmlformats.org/officeDocument/2006/relationships" xmlns:p="http://schemas.openxmlformats.org/presentationml/2006/main">
+  <p:cSld>
+    <p:spTree>
+      <p:nvGrpSpPr>
+        <p:cNvPr id="1" name=""/>
+        <p:cNvGrpSpPr/>
+        <p:nvPr/>
+      </p:nvGrpSpPr>
+      <p:grpSpPr>
+        <a:xfrm>
+          <a:off x="0" y="0"/>
+          <a:ext cx="0" cy="0"/>
+          <a:chOff x="0" y="0"/>
+          <a:chExt cx="0" cy="0"/>
+        </a:xfrm>
+      </p:grpSpPr>
+      <p:sp>
+        <p:nvSpPr>
+          <p:cNvPr id="2" name="Title 1">
+            <a:extLst>
+              <a:ext uri="{FF2B5EF4-FFF2-40B4-BE49-F238E27FC236}">
+                <a16:creationId xmlns:a16="http://schemas.microsoft.com/office/drawing/2014/main" id="{E4FF0A19-E90E-5646-B59A-EDB3147ADFFA}"/>
+              </a:ext>
+            </a:extLst>
+          </p:cNvPr>
+          <p:cNvSpPr>
+            <a:spLocks noGrp="1"/>
+          </p:cNvSpPr>
+          <p:nvPr>
+            <p:ph type="title"/>
+          </p:nvPr>
+        </p:nvSpPr>
+        <p:spPr/>
+        <p:txBody>
+          <a:bodyPr/>
+          <a:lstStyle/>
+          <a:p>
+            <a:r>
+              <a:rPr lang="en-GB" dirty="0"/>
+              <a:t>Requirements and Open Issues</a:t>
+            </a:r>
+          </a:p>
+        </p:txBody>
+      </p:sp>
+      <p:sp>
+        <p:nvSpPr>
+          <p:cNvPr id="3" name="Content Placeholder 2">
+            <a:extLst>
+              <a:ext uri="{FF2B5EF4-FFF2-40B4-BE49-F238E27FC236}">
+                <a16:creationId xmlns:a16="http://schemas.microsoft.com/office/drawing/2014/main" id="{A19A3074-6E0D-6040-9137-431FDA30A0A9}"/>
+              </a:ext>
+            </a:extLst>
+          </p:cNvPr>
+          <p:cNvSpPr>
+            <a:spLocks noGrp="1"/>
+          </p:cNvSpPr>
+          <p:nvPr>
+            <p:ph sz="quarter" idx="10"/>
+          </p:nvPr>
+        </p:nvSpPr>
+        <p:spPr/>
+        <p:txBody>
+          <a:bodyPr/>
+          <a:lstStyle/>
+          <a:p>
+            <a:r>
+              <a:rPr lang="en-GB" dirty="0"/>
+              <a:t>Trust and authentication</a:t>
+            </a:r>
+          </a:p>
+          <a:p>
+            <a:r>
+              <a:rPr lang="en-GB" dirty="0"/>
+              <a:t>Control protocol and support functions</a:t>
+            </a:r>
+          </a:p>
+          <a:p>
+            <a:r>
+              <a:rPr lang="en-GB" dirty="0"/>
+              <a:t>Discovery</a:t>
+            </a:r>
+          </a:p>
+          <a:p>
+            <a:endParaRPr lang="en-GB" dirty="0"/>
+          </a:p>
+        </p:txBody>
+      </p:sp>
+    </p:spTree>
+    <p:extLst>
+      <p:ext uri="{BB962C8B-B14F-4D97-AF65-F5344CB8AC3E}">
+        <p14:creationId xmlns:p14="http://schemas.microsoft.com/office/powerpoint/2010/main" val="4019386652"/>
+      </p:ext>
+    </p:extLst>
+  </p:cSld>
+  <p:clrMapOvr>
+    <a:masterClrMapping/>
+  </p:clrMapOvr>
+</p:sld>
+</file>
+
+<file path=ppt/slides/slide11.xml><?xml version="1.0" encoding="utf-8"?>
+<p:sld xmlns:a="http://schemas.openxmlformats.org/drawingml/2006/main" xmlns:r="http://schemas.openxmlformats.org/officeDocument/2006/relationships" xmlns:p="http://schemas.openxmlformats.org/presentationml/2006/main">
+  <p:cSld>
+    <p:spTree>
+      <p:nvGrpSpPr>
+        <p:cNvPr id="1" name=""/>
+        <p:cNvGrpSpPr/>
+        <p:nvPr/>
+      </p:nvGrpSpPr>
+      <p:grpSpPr>
+        <a:xfrm>
+          <a:off x="0" y="0"/>
+          <a:ext cx="0" cy="0"/>
+          <a:chOff x="0" y="0"/>
+          <a:chExt cx="0" cy="0"/>
+        </a:xfrm>
+      </p:grpSpPr>
+      <p:sp>
+        <p:nvSpPr>
+          <p:cNvPr id="2" name="Title 1">
+            <a:extLst>
+              <a:ext uri="{FF2B5EF4-FFF2-40B4-BE49-F238E27FC236}">
+                <a16:creationId xmlns:a16="http://schemas.microsoft.com/office/drawing/2014/main" id="{6E3AA9DB-3927-6D4E-B4A4-80F7254BC85A}"/>
+              </a:ext>
+            </a:extLst>
+          </p:cNvPr>
+          <p:cNvSpPr>
+            <a:spLocks noGrp="1"/>
+          </p:cNvSpPr>
+          <p:nvPr>
+            <p:ph type="title"/>
+          </p:nvPr>
+        </p:nvSpPr>
+        <p:spPr/>
+        <p:txBody>
+          <a:bodyPr/>
+          <a:lstStyle/>
+          <a:p>
+            <a:r>
+              <a:rPr lang="en-US" dirty="0"/>
+              <a:t>Drafts</a:t>
+            </a:r>
+          </a:p>
+        </p:txBody>
+      </p:sp>
+      <p:sp>
+        <p:nvSpPr>
+          <p:cNvPr id="3" name="Content Placeholder 2">
+            <a:extLst>
+              <a:ext uri="{FF2B5EF4-FFF2-40B4-BE49-F238E27FC236}">
+                <a16:creationId xmlns:a16="http://schemas.microsoft.com/office/drawing/2014/main" id="{827C647E-30BE-0A41-B3BC-64D9BA88D4E5}"/>
+              </a:ext>
+            </a:extLst>
+          </p:cNvPr>
+          <p:cNvSpPr>
+            <a:spLocks noGrp="1"/>
+          </p:cNvSpPr>
+          <p:nvPr>
+            <p:ph sz="quarter" idx="10"/>
+          </p:nvPr>
+        </p:nvSpPr>
+        <p:spPr/>
+        <p:txBody>
+          <a:bodyPr/>
+          <a:lstStyle/>
+          <a:p>
+            <a:r>
+              <a:rPr lang="de-DE" dirty="0"/>
+              <a:t>QUIC </a:t>
+            </a:r>
+            <a:r>
+              <a:rPr lang="de-DE" dirty="0" err="1"/>
+              <a:t>as</a:t>
+            </a:r>
+            <a:r>
+              <a:rPr lang="de-DE" dirty="0"/>
+              <a:t> a Substrate - </a:t>
+            </a:r>
+            <a:r>
+              <a:rPr lang="de-DE" dirty="0">
+                <a:hlinkClick r:id="rId2"/>
+              </a:rPr>
+              <a:t>https://tools.ietf.org/html/draft-kuehlewind-quic-substrate-00</a:t>
+            </a:r>
+            <a:endParaRPr lang="en-US" altLang="en-US" dirty="0"/>
+          </a:p>
+          <a:p>
+            <a:r>
+              <a:rPr lang="en-US" altLang="en-US" dirty="0"/>
+              <a:t>MASQUE - </a:t>
+            </a:r>
+            <a:r>
+              <a:rPr lang="en-US" altLang="en-US" dirty="0">
+                <a:hlinkClick r:id="rId3"/>
+              </a:rPr>
+              <a:t>https://tools.ietf.org/html/draft-schinazi-masque</a:t>
+            </a:r>
+            <a:r>
+              <a:rPr lang="en-US" altLang="en-US" dirty="0"/>
+              <a:t> </a:t>
+            </a:r>
+          </a:p>
+          <a:p>
+            <a:r>
+              <a:rPr lang="de-DE" dirty="0"/>
+              <a:t>HTTP Transport Authentication - </a:t>
+            </a:r>
+            <a:r>
+              <a:rPr lang="de-DE" dirty="0">
+                <a:hlinkClick r:id="rId4"/>
+              </a:rPr>
+              <a:t>https://tools.ietf.org/html/draft-schinazi-httpbis-transport-auth-00</a:t>
+            </a:r>
+            <a:endParaRPr lang="en-US" altLang="en-US" dirty="0"/>
+          </a:p>
+          <a:p>
+            <a:endParaRPr lang="en-US" altLang="en-US" dirty="0"/>
+          </a:p>
+          <a:p>
+            <a:r>
+              <a:rPr lang="en-US" altLang="en-US" dirty="0"/>
+              <a:t>Also, previous and related drafts:</a:t>
+            </a:r>
+          </a:p>
+          <a:p>
+            <a:pPr lvl="1"/>
+            <a:r>
+              <a:rPr lang="en-US" altLang="en-US" dirty="0"/>
+              <a:t>HELLIUM - </a:t>
+            </a:r>
+            <a:r>
+              <a:rPr lang="en-US" altLang="en-US" dirty="0">
+                <a:hlinkClick r:id="rId5"/>
+              </a:rPr>
+              <a:t>https://tools.ietf.org/html/draft-schwartz-httpbis-helium</a:t>
+            </a:r>
+            <a:r>
+              <a:rPr lang="en-US" altLang="en-US" dirty="0"/>
+              <a:t> </a:t>
+            </a:r>
+          </a:p>
+          <a:p>
+            <a:pPr lvl="1"/>
+            <a:r>
+              <a:rPr lang="en-US" altLang="en-US" dirty="0"/>
+              <a:t>HINT - </a:t>
+            </a:r>
+            <a:r>
+              <a:rPr lang="en-US" altLang="en-US" dirty="0">
+                <a:hlinkClick r:id="rId6"/>
+              </a:rPr>
+              <a:t>https://tools.ietf.org/html/draft-pardue-httpbis-http-network-tunnelling</a:t>
+            </a:r>
+            <a:r>
+              <a:rPr lang="en-US" altLang="en-US" dirty="0"/>
+              <a:t> </a:t>
+            </a:r>
+          </a:p>
+          <a:p>
+            <a:pPr lvl="1"/>
+            <a:r>
+              <a:rPr lang="en-US" altLang="en-US" dirty="0"/>
+              <a:t>QUIC Datagram - </a:t>
+            </a:r>
+            <a:r>
+              <a:rPr lang="en-US" altLang="en-US" dirty="0">
+                <a:hlinkClick r:id="rId7"/>
+              </a:rPr>
+              <a:t>https://tools.ietf.org/html/draft-pauly-quic-datagram</a:t>
+            </a:r>
+            <a:endParaRPr lang="en-US" altLang="en-US" dirty="0"/>
+          </a:p>
+          <a:p>
+            <a:pPr marL="0" indent="0">
+              <a:buNone/>
+            </a:pPr>
+            <a:endParaRPr lang="en-US" dirty="0"/>
+          </a:p>
+        </p:txBody>
+      </p:sp>
+      <p:sp>
+        <p:nvSpPr>
+          <p:cNvPr id="4" name="TextBox 3">
+            <a:extLst>
+              <a:ext uri="{FF2B5EF4-FFF2-40B4-BE49-F238E27FC236}">
+                <a16:creationId xmlns:a16="http://schemas.microsoft.com/office/drawing/2014/main" id="{7AD0CDD8-A1AE-4648-A710-D2CA47030888}"/>
+              </a:ext>
+            </a:extLst>
+          </p:cNvPr>
+          <p:cNvSpPr txBox="1"/>
+          <p:nvPr/>
+        </p:nvSpPr>
+        <p:spPr bwMode="auto">
+          <a:xfrm>
+            <a:off x="10960925" y="4690753"/>
+            <a:ext cx="0" cy="0"/>
+          </a:xfrm>
+          <a:prstGeom prst="rect">
+            <a:avLst/>
+          </a:prstGeom>
+          <a:noFill/>
+          <a:ln w="12700">
+            <a:noFill/>
+            <a:miter lim="800000"/>
+            <a:headEnd/>
+            <a:tailEnd/>
+          </a:ln>
+        </p:spPr>
+        <p:txBody>
+          <a:bodyPr vert="horz" wrap="none" lIns="72000" tIns="36000" rIns="73152" bIns="36576" numCol="1" rtlCol="0" anchor="t" anchorCtr="0" compatLnSpc="1">
+            <a:prstTxWarp prst="textNoShape">
+              <a:avLst/>
+            </a:prstTxWarp>
+            <a:noAutofit/>
+          </a:bodyPr>
+          <a:lstStyle/>
+          <a:p>
+            <a:pPr marL="344488" indent="-344488" algn="l">
+              <a:buClr>
+                <a:schemeClr val="tx1"/>
+              </a:buClr>
+              <a:buFont typeface="Ericsson Hilda Light" panose="00000400000000000000" pitchFamily="2" charset="0"/>
+              <a:buChar char="—"/>
+            </a:pPr>
+            <a:endParaRPr lang="en-GB" sz="2000" dirty="0" err="1"/>
+          </a:p>
+        </p:txBody>
+      </p:sp>
+    </p:spTree>
+    <p:extLst>
+      <p:ext uri="{BB962C8B-B14F-4D97-AF65-F5344CB8AC3E}">
+        <p14:creationId xmlns:p14="http://schemas.microsoft.com/office/powerpoint/2010/main" val="881592644"/>
+      </p:ext>
+    </p:extLst>
+  </p:cSld>
+  <p:clrMapOvr>
+    <a:masterClrMapping/>
+  </p:clrMapOvr>
+</p:sld>
+</file>
+
+<file path=ppt/slides/slide12.xml><?xml version="1.0" encoding="utf-8"?>
+<p:sld xmlns:a="http://schemas.openxmlformats.org/drawingml/2006/main" xmlns:r="http://schemas.openxmlformats.org/officeDocument/2006/relationships" xmlns:p="http://schemas.openxmlformats.org/presentationml/2006/main" show="0">
+  <p:cSld>
+    <p:spTree>
+      <p:nvGrpSpPr>
+        <p:cNvPr id="1" name=""/>
+        <p:cNvGrpSpPr/>
+        <p:nvPr/>
+      </p:nvGrpSpPr>
+      <p:grpSpPr>
+        <a:xfrm>
+          <a:off x="0" y="0"/>
+          <a:ext cx="0" cy="0"/>
+          <a:chOff x="0" y="0"/>
+          <a:chExt cx="0" cy="0"/>
+        </a:xfrm>
+      </p:grpSpPr>
+      <p:sp>
+        <p:nvSpPr>
+          <p:cNvPr id="2" name="Title 1">
+            <a:extLst>
+              <a:ext uri="{FF2B5EF4-FFF2-40B4-BE49-F238E27FC236}">
+                <a16:creationId xmlns:a16="http://schemas.microsoft.com/office/drawing/2014/main" id="{E247F2A1-5907-B944-8324-15FB1ACA4DAA}"/>
+              </a:ext>
+            </a:extLst>
+          </p:cNvPr>
+          <p:cNvSpPr>
+            <a:spLocks noGrp="1"/>
+          </p:cNvSpPr>
+          <p:nvPr>
+            <p:ph type="title"/>
+          </p:nvPr>
+        </p:nvSpPr>
+        <p:spPr/>
+        <p:txBody>
+          <a:bodyPr/>
+          <a:lstStyle/>
+          <a:p>
+            <a:r>
+              <a:rPr lang="en-GB" b="1"/>
+              <a:t>Usage Scenarios</a:t>
+            </a:r>
+            <a:br>
+              <a:rPr lang="en-GB" b="1"/>
+            </a:br>
+            <a:r>
+              <a:rPr lang="en-GB" b="1"/>
+              <a:t>draft-kuehlewind-quic-substrate</a:t>
+            </a:r>
+            <a:endParaRPr lang="en-GB"/>
+          </a:p>
+        </p:txBody>
+      </p:sp>
+      <p:sp>
+        <p:nvSpPr>
+          <p:cNvPr id="3" name="Content Placeholder 2">
+            <a:extLst>
+              <a:ext uri="{FF2B5EF4-FFF2-40B4-BE49-F238E27FC236}">
+                <a16:creationId xmlns:a16="http://schemas.microsoft.com/office/drawing/2014/main" id="{F192BE01-3745-A347-A5B1-DB80BA186C0D}"/>
+              </a:ext>
+            </a:extLst>
+          </p:cNvPr>
+          <p:cNvSpPr>
+            <a:spLocks noGrp="1"/>
+          </p:cNvSpPr>
+          <p:nvPr>
+            <p:ph sz="quarter" idx="10"/>
+          </p:nvPr>
+        </p:nvSpPr>
+        <p:spPr>
+          <a:xfrm>
+            <a:off x="479425" y="1844675"/>
+            <a:ext cx="11277146" cy="4392612"/>
+          </a:xfrm>
+        </p:spPr>
+        <p:txBody>
+          <a:bodyPr/>
+          <a:lstStyle/>
+          <a:p>
+            <a:r>
+              <a:rPr lang="en-GB" b="1" dirty="0"/>
+              <a:t>Obfuscation via Tunnelling</a:t>
+            </a:r>
+          </a:p>
+          <a:p>
+            <a:pPr lvl="1"/>
+            <a:r>
+              <a:rPr lang="en-GB" sz="1800" dirty="0"/>
+              <a:t>Client knows proxy and connects to request forwarding</a:t>
+            </a:r>
+          </a:p>
+          <a:p>
+            <a:pPr lvl="2"/>
+            <a:r>
+              <a:rPr lang="en-GB" sz="1800" dirty="0"/>
+              <a:t>Client and proxy have a trust relationship and can optionally authenticate each other (see MASQUE)</a:t>
+            </a:r>
+          </a:p>
+          <a:p>
+            <a:pPr lvl="1"/>
+            <a:r>
+              <a:rPr lang="en-GB" sz="1800" dirty="0"/>
+              <a:t>Server is not aware of the proxy and does not see the clients IP address</a:t>
+            </a:r>
+          </a:p>
+          <a:p>
+            <a:r>
+              <a:rPr lang="en-GB" b="1" dirty="0"/>
+              <a:t>Advanced Support of User Agents</a:t>
+            </a:r>
+          </a:p>
+          <a:p>
+            <a:pPr lvl="1"/>
+            <a:r>
+              <a:rPr lang="en-GB" sz="1800" dirty="0"/>
+              <a:t>Proxy provides additional functionality (located "close" to the client e.g. access network)</a:t>
+            </a:r>
+          </a:p>
+          <a:p>
+            <a:pPr lvl="1"/>
+            <a:r>
+              <a:rPr lang="en-GB" sz="1800" dirty="0"/>
+              <a:t>Clients request function and may provide information to the proxy; optionally server can be aware</a:t>
+            </a:r>
+          </a:p>
+          <a:p>
+            <a:pPr lvl="1"/>
+            <a:r>
+              <a:rPr lang="en-GB" b="1" dirty="0"/>
+              <a:t>Security and Access Policy Enforcement</a:t>
+            </a:r>
+          </a:p>
+          <a:p>
+            <a:r>
+              <a:rPr lang="en-GB" b="1" dirty="0"/>
+              <a:t>Frontend Support for Load Balancing and Migration/Mobility</a:t>
+            </a:r>
+          </a:p>
+          <a:p>
+            <a:pPr lvl="1"/>
+            <a:r>
+              <a:rPr lang="en-GB" sz="1800" dirty="0"/>
+              <a:t>(Reverse) proxy may or may not be under the the same administrative domain as the service provider</a:t>
+            </a:r>
+          </a:p>
+          <a:p>
+            <a:pPr lvl="1"/>
+            <a:r>
+              <a:rPr lang="en-GB" sz="1800" dirty="0"/>
+              <a:t>Proxy supports load balancing and/or mobility without terminating the e2e/app security association </a:t>
+            </a:r>
+          </a:p>
+          <a:p>
+            <a:pPr lvl="1"/>
+            <a:r>
+              <a:rPr lang="en-GB" b="1" dirty="0"/>
+              <a:t>IoT Gateways</a:t>
+            </a:r>
+          </a:p>
+          <a:p>
+            <a:r>
+              <a:rPr lang="en-GB" b="1" dirty="0"/>
+              <a:t>Multi-hop Chaining (aka Onion Routing)</a:t>
+            </a:r>
+          </a:p>
+          <a:p>
+            <a:pPr lvl="1"/>
+            <a:endParaRPr lang="en-GB" b="1" dirty="0"/>
+          </a:p>
+          <a:p>
+            <a:endParaRPr lang="en-GB" b="1" dirty="0"/>
+          </a:p>
+          <a:p>
+            <a:endParaRPr lang="en-GB" dirty="0"/>
+          </a:p>
+        </p:txBody>
+      </p:sp>
+    </p:spTree>
+    <p:extLst>
+      <p:ext uri="{BB962C8B-B14F-4D97-AF65-F5344CB8AC3E}">
+        <p14:creationId xmlns:p14="http://schemas.microsoft.com/office/powerpoint/2010/main" val="2567181327"/>
       </p:ext>
     </p:extLst>
   </p:cSld>
@@ -22234,174 +22915,160 @@
       </p:grpSpPr>
       <p:sp>
         <p:nvSpPr>
-          <p:cNvPr id="2" name="Title 1">
-            <a:extLst>
-              <a:ext uri="{FF2B5EF4-FFF2-40B4-BE49-F238E27FC236}">
-                <a16:creationId xmlns:a16="http://schemas.microsoft.com/office/drawing/2014/main" id="{E247F2A1-5907-B944-8324-15FB1ACA4DAA}"/>
-              </a:ext>
-            </a:extLst>
-          </p:cNvPr>
-          <p:cNvSpPr>
+          <p:cNvPr id="518" name="Title 1"/>
+          <p:cNvSpPr txBox="1">
             <a:spLocks noGrp="1"/>
           </p:cNvSpPr>
           <p:nvPr>
             <p:ph type="title"/>
           </p:nvPr>
         </p:nvSpPr>
-        <p:spPr/>
+        <p:spPr>
+          <a:xfrm>
+            <a:off x="479425" y="476250"/>
+            <a:ext cx="8353426" cy="1081088"/>
+          </a:xfrm>
+          <a:prstGeom prst="rect">
+            <a:avLst/>
+          </a:prstGeom>
+        </p:spPr>
         <p:txBody>
           <a:bodyPr/>
           <a:lstStyle/>
           <a:p>
-            <a:r>
-              <a:rPr lang="en-GB" b="1"/>
+            <a:pPr defTabSz="841247">
+              <a:spcBef>
+                <a:spcPts val="200"/>
+              </a:spcBef>
+              <a:defRPr sz="3680" b="1" spc="-184"/>
+            </a:pPr>
+            <a:r>
               <a:t>Usage Scenarios</a:t>
             </a:r>
-            <a:br>
-              <a:rPr lang="en-GB" b="1"/>
-            </a:br>
-            <a:r>
-              <a:rPr lang="en-GB" b="1"/>
+            <a:br/>
+            <a:r>
               <a:t>draft-kuehlewind-quic-substrate</a:t>
             </a:r>
-            <a:endParaRPr lang="en-GB"/>
           </a:p>
         </p:txBody>
       </p:sp>
       <p:sp>
         <p:nvSpPr>
-          <p:cNvPr id="3" name="Content Placeholder 2">
-            <a:extLst>
-              <a:ext uri="{FF2B5EF4-FFF2-40B4-BE49-F238E27FC236}">
-                <a16:creationId xmlns:a16="http://schemas.microsoft.com/office/drawing/2014/main" id="{F192BE01-3745-A347-A5B1-DB80BA186C0D}"/>
-              </a:ext>
-            </a:extLst>
-          </p:cNvPr>
-          <p:cNvSpPr>
+          <p:cNvPr id="519" name="Content Placeholder 2"/>
+          <p:cNvSpPr txBox="1">
             <a:spLocks noGrp="1"/>
           </p:cNvSpPr>
           <p:nvPr>
-            <p:ph sz="quarter" idx="10"/>
+            <p:ph type="body" idx="1"/>
           </p:nvPr>
         </p:nvSpPr>
         <p:spPr>
           <a:xfrm>
-            <a:off x="479425" y="1844675"/>
-            <a:ext cx="11277146" cy="4392612"/>
+            <a:off x="479424" y="1844675"/>
+            <a:ext cx="11277148" cy="4392613"/>
           </a:xfrm>
+          <a:prstGeom prst="rect">
+            <a:avLst/>
+          </a:prstGeom>
         </p:spPr>
         <p:txBody>
           <a:bodyPr/>
           <a:lstStyle/>
           <a:p>
-            <a:r>
-              <a:rPr lang="en-GB" b="1" dirty="0"/>
-              <a:t>Obfuscation via Tunnelling</a:t>
-            </a:r>
-          </a:p>
-          <a:p>
-            <a:pPr lvl="1"/>
-            <a:r>
-              <a:rPr lang="en-GB" sz="1800" dirty="0"/>
-              <a:t>Client knows proxy and connects to request forwarding</a:t>
-            </a:r>
-          </a:p>
-          <a:p>
-            <a:pPr lvl="2"/>
-            <a:r>
-              <a:rPr lang="en-GB" sz="1800" dirty="0"/>
-              <a:t>Client and proxy have a trust relationship and can optionally authenticate each other (see MASQUE)</a:t>
-            </a:r>
-          </a:p>
-          <a:p>
-            <a:pPr lvl="1"/>
-            <a:r>
-              <a:rPr lang="en-GB" sz="1800" dirty="0"/>
-              <a:t>Server is not aware of the proxy and does not see the clients IP address</a:t>
-            </a:r>
-          </a:p>
-          <a:p>
-            <a:r>
-              <a:rPr lang="en-GB" b="1" dirty="0"/>
+            <a:pPr>
+              <a:defRPr b="1" spc="-100"/>
+            </a:pPr>
+            <a:r>
+              <a:rPr dirty="0"/>
+              <a:t>Obfuscation via Tunneling</a:t>
+            </a:r>
+          </a:p>
+          <a:p>
+            <a:pPr>
+              <a:defRPr b="1" spc="-100"/>
+            </a:pPr>
+            <a:r>
+              <a:rPr dirty="0"/>
               <a:t>Advanced Support of User Agents</a:t>
             </a:r>
-          </a:p>
-          <a:p>
-            <a:pPr lvl="1"/>
-            <a:r>
-              <a:rPr lang="en-GB" sz="1800" dirty="0"/>
-              <a:t>Proxy provides additional functionality (located "close" to the client e.g. access network)</a:t>
-            </a:r>
-          </a:p>
-          <a:p>
-            <a:pPr lvl="1"/>
-            <a:r>
-              <a:rPr lang="en-GB" sz="1800" dirty="0"/>
-              <a:t>Clients request function and may provide information to the proxy; optionally server can be aware</a:t>
-            </a:r>
-          </a:p>
-          <a:p>
-            <a:pPr lvl="1"/>
-            <a:r>
-              <a:rPr lang="en-GB" b="1" dirty="0"/>
-              <a:t>Security and Access Policy Enforcement</a:t>
-            </a:r>
-          </a:p>
-          <a:p>
-            <a:r>
-              <a:rPr lang="en-GB" b="1" dirty="0"/>
+            <a:endParaRPr lang="de-DE" dirty="0"/>
+          </a:p>
+          <a:p>
+            <a:pPr lvl="1">
+              <a:defRPr b="1" spc="-100"/>
+            </a:pPr>
+            <a:r>
+              <a:rPr lang="de-DE" dirty="0"/>
+              <a:t>Security </a:t>
+            </a:r>
+            <a:r>
+              <a:rPr lang="de-DE" dirty="0" err="1"/>
+              <a:t>and</a:t>
+            </a:r>
+            <a:r>
+              <a:rPr lang="de-DE" dirty="0"/>
+              <a:t> Access </a:t>
+            </a:r>
+            <a:r>
+              <a:rPr lang="de-DE" dirty="0" err="1"/>
+              <a:t>Policy</a:t>
+            </a:r>
+            <a:r>
+              <a:rPr lang="de-DE" dirty="0"/>
+              <a:t> </a:t>
+            </a:r>
+            <a:r>
+              <a:rPr lang="de-DE" dirty="0" err="1"/>
+              <a:t>Enforcement</a:t>
+            </a:r>
+            <a:endParaRPr dirty="0"/>
+          </a:p>
+          <a:p>
+            <a:pPr>
+              <a:defRPr b="1" spc="-100"/>
+            </a:pPr>
+            <a:r>
+              <a:rPr dirty="0"/>
               <a:t>Frontend Support for Load Balancing and Migration/Mobility</a:t>
             </a:r>
-          </a:p>
-          <a:p>
-            <a:pPr lvl="1"/>
-            <a:r>
-              <a:rPr lang="en-GB" sz="1800" dirty="0"/>
-              <a:t>(Reverse) proxy may or may not be under the the same administrative domain as the service provider</a:t>
-            </a:r>
-          </a:p>
-          <a:p>
-            <a:pPr lvl="1"/>
-            <a:r>
-              <a:rPr lang="en-GB" sz="1800" dirty="0"/>
-              <a:t>Proxy supports load balancing and/or mobility without terminating the e2e/app security association </a:t>
-            </a:r>
-          </a:p>
-          <a:p>
-            <a:pPr lvl="1"/>
-            <a:r>
-              <a:rPr lang="en-GB" b="1" dirty="0"/>
-              <a:t>IoT Gateways</a:t>
-            </a:r>
-          </a:p>
-          <a:p>
-            <a:r>
-              <a:rPr lang="en-GB" b="1" dirty="0"/>
+            <a:endParaRPr lang="de-DE" dirty="0"/>
+          </a:p>
+          <a:p>
+            <a:pPr lvl="1">
+              <a:defRPr b="1" spc="-100"/>
+            </a:pPr>
+            <a:r>
+              <a:rPr lang="de-DE" dirty="0" err="1"/>
+              <a:t>IoT</a:t>
+            </a:r>
+            <a:r>
+              <a:rPr lang="de-DE" dirty="0"/>
+              <a:t> Gateway</a:t>
+            </a:r>
+            <a:endParaRPr dirty="0"/>
+          </a:p>
+          <a:p>
+            <a:pPr>
+              <a:defRPr b="1" spc="-100"/>
+            </a:pPr>
+            <a:r>
+              <a:rPr dirty="0"/>
               <a:t>Multi-hop Chaining (aka Onion Routing)</a:t>
             </a:r>
-          </a:p>
-          <a:p>
-            <a:pPr lvl="1"/>
-            <a:endParaRPr lang="en-GB" b="1" dirty="0"/>
-          </a:p>
-          <a:p>
-            <a:endParaRPr lang="en-GB" b="1" dirty="0"/>
-          </a:p>
-          <a:p>
-            <a:endParaRPr lang="en-GB" dirty="0"/>
           </a:p>
         </p:txBody>
       </p:sp>
     </p:spTree>
     <p:extLst>
       <p:ext uri="{BB962C8B-B14F-4D97-AF65-F5344CB8AC3E}">
-        <p14:creationId xmlns:p14="http://schemas.microsoft.com/office/powerpoint/2010/main" val="2567181327"/>
+        <p14:creationId xmlns:p14="http://schemas.microsoft.com/office/powerpoint/2010/main" val="958303392"/>
       </p:ext>
     </p:extLst>
   </p:cSld>
   <p:clrMapOvr>
     <a:masterClrMapping/>
   </p:clrMapOvr>
+  <p:transition spd="med"/>
 </p:sld>
 </file>
 
@@ -22424,85 +23091,545 @@
       </p:grpSpPr>
       <p:sp>
         <p:nvSpPr>
-          <p:cNvPr id="2" name="Title 1">
-            <a:extLst>
-              <a:ext uri="{FF2B5EF4-FFF2-40B4-BE49-F238E27FC236}">
-                <a16:creationId xmlns:a16="http://schemas.microsoft.com/office/drawing/2014/main" id="{E4FF0A19-E90E-5646-B59A-EDB3147ADFFA}"/>
-              </a:ext>
-            </a:extLst>
-          </p:cNvPr>
-          <p:cNvSpPr>
+          <p:cNvPr id="521" name="Title 1"/>
+          <p:cNvSpPr txBox="1">
             <a:spLocks noGrp="1"/>
           </p:cNvSpPr>
           <p:nvPr>
             <p:ph type="title"/>
           </p:nvPr>
         </p:nvSpPr>
-        <p:spPr/>
+        <p:spPr>
+          <a:xfrm>
+            <a:off x="479425" y="476250"/>
+            <a:ext cx="8353426" cy="1081088"/>
+          </a:xfrm>
+          <a:prstGeom prst="rect">
+            <a:avLst/>
+          </a:prstGeom>
+        </p:spPr>
         <p:txBody>
           <a:bodyPr/>
-          <a:lstStyle/>
-          <a:p>
-            <a:r>
-              <a:rPr lang="en-GB" dirty="0"/>
-              <a:t>Requirements and Open Issues</a:t>
+          <a:lstStyle>
+            <a:lvl1pPr>
+              <a:defRPr b="1" spc="-200"/>
+            </a:lvl1pPr>
+          </a:lstStyle>
+          <a:p>
+            <a:r>
+              <a:t>Obfuscation via Tunneling</a:t>
             </a:r>
           </a:p>
         </p:txBody>
       </p:sp>
       <p:sp>
         <p:nvSpPr>
-          <p:cNvPr id="3" name="Content Placeholder 2">
-            <a:extLst>
-              <a:ext uri="{FF2B5EF4-FFF2-40B4-BE49-F238E27FC236}">
-                <a16:creationId xmlns:a16="http://schemas.microsoft.com/office/drawing/2014/main" id="{A19A3074-6E0D-6040-9137-431FDA30A0A9}"/>
-              </a:ext>
-            </a:extLst>
-          </p:cNvPr>
-          <p:cNvSpPr>
+          <p:cNvPr id="522" name="Content Placeholder 2"/>
+          <p:cNvSpPr txBox="1">
             <a:spLocks noGrp="1"/>
           </p:cNvSpPr>
           <p:nvPr>
-            <p:ph sz="quarter" idx="10"/>
+            <p:ph type="body" sz="quarter" idx="1"/>
           </p:nvPr>
         </p:nvSpPr>
-        <p:spPr/>
+        <p:spPr>
+          <a:xfrm>
+            <a:off x="479424" y="1844675"/>
+            <a:ext cx="11277148" cy="1299923"/>
+          </a:xfrm>
+          <a:prstGeom prst="rect">
+            <a:avLst/>
+          </a:prstGeom>
+        </p:spPr>
         <p:txBody>
-          <a:bodyPr/>
+          <a:bodyPr>
+            <a:normAutofit/>
+          </a:bodyPr>
           <a:lstStyle/>
           <a:p>
-            <a:r>
-              <a:rPr lang="en-GB" dirty="0"/>
-              <a:t>Trust and authentication</a:t>
-            </a:r>
-          </a:p>
-          <a:p>
-            <a:r>
-              <a:rPr lang="en-GB" dirty="0"/>
-              <a:t>Control protocol and support functions</a:t>
-            </a:r>
-          </a:p>
-          <a:p>
-            <a:r>
-              <a:rPr lang="en-GB" dirty="0"/>
-              <a:t>Discovery</a:t>
-            </a:r>
-          </a:p>
-          <a:p>
-            <a:endParaRPr lang="en-GB" dirty="0"/>
+            <a:pPr>
+              <a:defRPr sz="1800" spc="-100"/>
+            </a:pPr>
+            <a:r>
+              <a:rPr dirty="0"/>
+              <a:t>Client knows proxy and connects to request forwarding</a:t>
+            </a:r>
+          </a:p>
+          <a:p>
+            <a:pPr lvl="1">
+              <a:defRPr sz="1800" spc="-100"/>
+            </a:pPr>
+            <a:r>
+              <a:rPr dirty="0"/>
+              <a:t>Client and proxy have a trust relationship and can optionally authenticate each other (see MASQUE)</a:t>
+            </a:r>
+          </a:p>
+          <a:p>
+            <a:pPr>
+              <a:defRPr sz="1800" spc="-100"/>
+            </a:pPr>
+            <a:r>
+              <a:rPr dirty="0"/>
+              <a:t>Server is not aware of the proxy and does not see the clients IP address</a:t>
+            </a:r>
+          </a:p>
+        </p:txBody>
+      </p:sp>
+      <p:grpSp>
+        <p:nvGrpSpPr>
+          <p:cNvPr id="526" name="Group"/>
+          <p:cNvGrpSpPr/>
+          <p:nvPr/>
+        </p:nvGrpSpPr>
+        <p:grpSpPr>
+          <a:xfrm>
+            <a:off x="2739164" y="4046972"/>
+            <a:ext cx="4394191" cy="870222"/>
+            <a:chOff x="0" y="0"/>
+            <a:chExt cx="4394189" cy="870221"/>
+          </a:xfrm>
+        </p:grpSpPr>
+        <p:sp>
+          <p:nvSpPr>
+            <p:cNvPr id="523" name="Rectangle"/>
+            <p:cNvSpPr/>
+            <p:nvPr/>
+          </p:nvSpPr>
+          <p:spPr>
+            <a:xfrm>
+              <a:off x="158888" y="0"/>
+              <a:ext cx="4055716" cy="870222"/>
+            </a:xfrm>
+            <a:prstGeom prst="rect">
+              <a:avLst/>
+            </a:prstGeom>
+            <a:solidFill>
+              <a:srgbClr val="3980E8"/>
+            </a:solidFill>
+            <a:ln w="12700" cap="flat">
+              <a:noFill/>
+              <a:miter lim="400000"/>
+            </a:ln>
+            <a:effectLst/>
+          </p:spPr>
+          <p:txBody>
+            <a:bodyPr wrap="square" lIns="36000" tIns="36000" rIns="36000" bIns="36000" numCol="1" anchor="t">
+              <a:noAutofit/>
+            </a:bodyPr>
+            <a:lstStyle/>
+            <a:p>
+              <a:endParaRPr/>
+            </a:p>
+          </p:txBody>
+        </p:sp>
+        <p:sp>
+          <p:nvSpPr>
+            <p:cNvPr id="524" name="Oval"/>
+            <p:cNvSpPr/>
+            <p:nvPr/>
+          </p:nvSpPr>
+          <p:spPr>
+            <a:xfrm>
+              <a:off x="4019688" y="0"/>
+              <a:ext cx="374502" cy="870222"/>
+            </a:xfrm>
+            <a:prstGeom prst="ellipse">
+              <a:avLst/>
+            </a:prstGeom>
+            <a:solidFill>
+              <a:srgbClr val="3980E8"/>
+            </a:solidFill>
+            <a:ln w="12700" cap="flat">
+              <a:noFill/>
+              <a:miter lim="400000"/>
+            </a:ln>
+            <a:effectLst/>
+          </p:spPr>
+          <p:txBody>
+            <a:bodyPr wrap="square" lIns="36000" tIns="36000" rIns="36000" bIns="36000" numCol="1" anchor="t">
+              <a:noAutofit/>
+            </a:bodyPr>
+            <a:lstStyle/>
+            <a:p>
+              <a:endParaRPr/>
+            </a:p>
+          </p:txBody>
+        </p:sp>
+        <p:sp>
+          <p:nvSpPr>
+            <p:cNvPr id="525" name="Oval"/>
+            <p:cNvSpPr/>
+            <p:nvPr/>
+          </p:nvSpPr>
+          <p:spPr>
+            <a:xfrm>
+              <a:off x="0" y="0"/>
+              <a:ext cx="374502" cy="870222"/>
+            </a:xfrm>
+            <a:prstGeom prst="ellipse">
+              <a:avLst/>
+            </a:prstGeom>
+            <a:solidFill>
+              <a:srgbClr val="FFFFFF"/>
+            </a:solidFill>
+            <a:ln w="12700" cap="flat">
+              <a:noFill/>
+              <a:miter lim="400000"/>
+            </a:ln>
+            <a:effectLst/>
+          </p:spPr>
+          <p:txBody>
+            <a:bodyPr wrap="square" lIns="36000" tIns="36000" rIns="36000" bIns="36000" numCol="1" anchor="t">
+              <a:noAutofit/>
+            </a:bodyPr>
+            <a:lstStyle/>
+            <a:p>
+              <a:endParaRPr/>
+            </a:p>
+          </p:txBody>
+        </p:sp>
+      </p:grpSp>
+      <p:sp>
+        <p:nvSpPr>
+          <p:cNvPr id="527" name="Notebook"/>
+          <p:cNvSpPr/>
+          <p:nvPr/>
+        </p:nvSpPr>
+        <p:spPr>
+          <a:xfrm>
+            <a:off x="1111690" y="4059672"/>
+            <a:ext cx="1508171" cy="844822"/>
+          </a:xfrm>
+          <a:custGeom>
+            <a:avLst/>
+            <a:gdLst/>
+            <a:ahLst/>
+            <a:cxnLst>
+              <a:cxn ang="0">
+                <a:pos x="wd2" y="hd2"/>
+              </a:cxn>
+              <a:cxn ang="5400000">
+                <a:pos x="wd2" y="hd2"/>
+              </a:cxn>
+              <a:cxn ang="10800000">
+                <a:pos x="wd2" y="hd2"/>
+              </a:cxn>
+              <a:cxn ang="16200000">
+                <a:pos x="wd2" y="hd2"/>
+              </a:cxn>
+            </a:cxnLst>
+            <a:rect l="0" t="0" r="r" b="b"/>
+            <a:pathLst>
+              <a:path w="21600" h="21599" extrusionOk="0">
+                <a:moveTo>
+                  <a:pt x="1952" y="0"/>
+                </a:moveTo>
+                <a:cubicBezTo>
+                  <a:pt x="1421" y="0"/>
+                  <a:pt x="1439" y="771"/>
+                  <a:pt x="1439" y="1718"/>
+                </a:cubicBezTo>
+                <a:lnTo>
+                  <a:pt x="1439" y="19328"/>
+                </a:lnTo>
+                <a:lnTo>
+                  <a:pt x="0" y="19328"/>
+                </a:lnTo>
+                <a:cubicBezTo>
+                  <a:pt x="0" y="19328"/>
+                  <a:pt x="0" y="19890"/>
+                  <a:pt x="0" y="20529"/>
+                </a:cubicBezTo>
+                <a:cubicBezTo>
+                  <a:pt x="0" y="21600"/>
+                  <a:pt x="190" y="21599"/>
+                  <a:pt x="896" y="21599"/>
+                </a:cubicBezTo>
+                <a:lnTo>
+                  <a:pt x="10332" y="21599"/>
+                </a:lnTo>
+                <a:lnTo>
+                  <a:pt x="11268" y="21599"/>
+                </a:lnTo>
+                <a:lnTo>
+                  <a:pt x="20704" y="21599"/>
+                </a:lnTo>
+                <a:cubicBezTo>
+                  <a:pt x="21367" y="21599"/>
+                  <a:pt x="21600" y="21600"/>
+                  <a:pt x="21600" y="20529"/>
+                </a:cubicBezTo>
+                <a:cubicBezTo>
+                  <a:pt x="21600" y="19890"/>
+                  <a:pt x="21600" y="19328"/>
+                  <a:pt x="21600" y="19328"/>
+                </a:cubicBezTo>
+                <a:lnTo>
+                  <a:pt x="20161" y="19328"/>
+                </a:lnTo>
+                <a:lnTo>
+                  <a:pt x="20161" y="1718"/>
+                </a:lnTo>
+                <a:cubicBezTo>
+                  <a:pt x="20161" y="771"/>
+                  <a:pt x="20196" y="0"/>
+                  <a:pt x="19665" y="0"/>
+                </a:cubicBezTo>
+                <a:lnTo>
+                  <a:pt x="1952" y="0"/>
+                </a:lnTo>
+                <a:close/>
+                <a:moveTo>
+                  <a:pt x="2475" y="1849"/>
+                </a:moveTo>
+                <a:lnTo>
+                  <a:pt x="19125" y="1849"/>
+                </a:lnTo>
+                <a:lnTo>
+                  <a:pt x="19125" y="19328"/>
+                </a:lnTo>
+                <a:lnTo>
+                  <a:pt x="11268" y="19328"/>
+                </a:lnTo>
+                <a:lnTo>
+                  <a:pt x="10332" y="19328"/>
+                </a:lnTo>
+                <a:lnTo>
+                  <a:pt x="2475" y="19328"/>
+                </a:lnTo>
+                <a:lnTo>
+                  <a:pt x="2475" y="1849"/>
+                </a:lnTo>
+                <a:close/>
+              </a:path>
+            </a:pathLst>
+          </a:custGeom>
+          <a:solidFill>
+            <a:srgbClr val="FFFFFF"/>
+          </a:solidFill>
+          <a:ln w="25400">
+            <a:solidFill>
+              <a:schemeClr val="accent1"/>
+            </a:solidFill>
+          </a:ln>
+        </p:spPr>
+        <p:txBody>
+          <a:bodyPr lIns="36000" tIns="36000" rIns="36000" bIns="36000"/>
+          <a:lstStyle/>
+          <a:p>
+            <a:endParaRPr/>
+          </a:p>
+        </p:txBody>
+      </p:sp>
+      <p:sp>
+        <p:nvSpPr>
+          <p:cNvPr id="528" name="Tunnel Proxy"/>
+          <p:cNvSpPr/>
+          <p:nvPr/>
+        </p:nvSpPr>
+        <p:spPr>
+          <a:xfrm>
+            <a:off x="7357419" y="3691783"/>
+            <a:ext cx="1271957" cy="1274524"/>
+          </a:xfrm>
+          <a:prstGeom prst="roundRect">
+            <a:avLst>
+              <a:gd name="adj" fmla="val 15000"/>
+            </a:avLst>
+          </a:prstGeom>
+          <a:solidFill>
+            <a:srgbClr val="FFFFFF"/>
+          </a:solidFill>
+          <a:ln w="25400">
+            <a:solidFill>
+              <a:schemeClr val="accent1"/>
+            </a:solidFill>
+          </a:ln>
+          <a:extLst>
+            <a:ext uri="{C572A759-6A51-4108-AA02-DFA0A04FC94B}">
+              <ma14:wrappingTextBoxFlag xmlns:ma14="http://schemas.microsoft.com/office/mac/drawingml/2011/main" xmlns:a14="http://schemas.microsoft.com/office/drawing/2010/main" xmlns:m="http://schemas.openxmlformats.org/officeDocument/2006/math" xmlns="" val="1"/>
+            </a:ext>
+          </a:extLst>
+        </p:spPr>
+        <p:txBody>
+          <a:bodyPr lIns="36000" tIns="36000" rIns="36000" bIns="36000" anchor="ctr"/>
+          <a:lstStyle>
+            <a:lvl1pPr algn="ctr"/>
+          </a:lstStyle>
+          <a:p>
+            <a:r>
+              <a:t>Tunnel Proxy</a:t>
+            </a:r>
+          </a:p>
+        </p:txBody>
+      </p:sp>
+      <p:sp>
+        <p:nvSpPr>
+          <p:cNvPr id="529" name="Server"/>
+          <p:cNvSpPr/>
+          <p:nvPr/>
+        </p:nvSpPr>
+        <p:spPr>
+          <a:xfrm>
+            <a:off x="9499091" y="3462412"/>
+            <a:ext cx="1271956" cy="2039342"/>
+          </a:xfrm>
+          <a:prstGeom prst="roundRect">
+            <a:avLst>
+              <a:gd name="adj" fmla="val 15000"/>
+            </a:avLst>
+          </a:prstGeom>
+          <a:solidFill>
+            <a:srgbClr val="FFFFFF"/>
+          </a:solidFill>
+          <a:ln w="25400">
+            <a:solidFill>
+              <a:schemeClr val="accent1"/>
+            </a:solidFill>
+          </a:ln>
+          <a:extLst>
+            <a:ext uri="{C572A759-6A51-4108-AA02-DFA0A04FC94B}">
+              <ma14:wrappingTextBoxFlag xmlns:ma14="http://schemas.microsoft.com/office/mac/drawingml/2011/main" xmlns:a14="http://schemas.microsoft.com/office/drawing/2010/main" xmlns:m="http://schemas.openxmlformats.org/officeDocument/2006/math" xmlns="" val="1"/>
+            </a:ext>
+          </a:extLst>
+        </p:spPr>
+        <p:txBody>
+          <a:bodyPr lIns="36000" tIns="36000" rIns="36000" bIns="36000" anchor="ctr"/>
+          <a:lstStyle>
+            <a:lvl1pPr algn="ctr"/>
+          </a:lstStyle>
+          <a:p>
+            <a:r>
+              <a:t>Server</a:t>
+            </a:r>
+          </a:p>
+        </p:txBody>
+      </p:sp>
+      <p:sp>
+        <p:nvSpPr>
+          <p:cNvPr id="530" name="QUIC Tunnel"/>
+          <p:cNvSpPr txBox="1"/>
+          <p:nvPr/>
+        </p:nvSpPr>
+        <p:spPr>
+          <a:xfrm>
+            <a:off x="4400610" y="4155061"/>
+            <a:ext cx="1406294" cy="351401"/>
+          </a:xfrm>
+          <a:prstGeom prst="rect">
+            <a:avLst/>
+          </a:prstGeom>
+          <a:ln w="12700">
+            <a:miter lim="400000"/>
+          </a:ln>
+          <a:extLst>
+            <a:ext uri="{C572A759-6A51-4108-AA02-DFA0A04FC94B}">
+              <ma14:wrappingTextBoxFlag xmlns:ma14="http://schemas.microsoft.com/office/mac/drawingml/2011/main" xmlns:a14="http://schemas.microsoft.com/office/drawing/2010/main" xmlns:m="http://schemas.openxmlformats.org/officeDocument/2006/math" xmlns="" val="1"/>
+            </a:ext>
+          </a:extLst>
+        </p:spPr>
+        <p:txBody>
+          <a:bodyPr wrap="none" lIns="36000" tIns="36000" rIns="36000" bIns="36000">
+            <a:spAutoFit/>
+          </a:bodyPr>
+          <a:lstStyle>
+            <a:lvl1pPr>
+              <a:defRPr>
+                <a:solidFill>
+                  <a:srgbClr val="FFFFFF"/>
+                </a:solidFill>
+              </a:defRPr>
+            </a:lvl1pPr>
+          </a:lstStyle>
+          <a:p>
+            <a:r>
+              <a:t>QUIC Tunnel</a:t>
+            </a:r>
+          </a:p>
+        </p:txBody>
+      </p:sp>
+      <p:sp>
+        <p:nvSpPr>
+          <p:cNvPr id="531" name="Line"/>
+          <p:cNvSpPr/>
+          <p:nvPr/>
+        </p:nvSpPr>
+        <p:spPr>
+          <a:xfrm>
+            <a:off x="2528545" y="4668325"/>
+            <a:ext cx="6952648" cy="1"/>
+          </a:xfrm>
+          <a:prstGeom prst="line">
+            <a:avLst/>
+          </a:prstGeom>
+          <a:ln w="254000">
+            <a:solidFill>
+              <a:srgbClr val="EBA281"/>
+            </a:solidFill>
+          </a:ln>
+        </p:spPr>
+        <p:txBody>
+          <a:bodyPr lIns="45719" rIns="45719"/>
+          <a:lstStyle/>
+          <a:p>
+            <a:endParaRPr/>
+          </a:p>
+        </p:txBody>
+      </p:sp>
+      <p:sp>
+        <p:nvSpPr>
+          <p:cNvPr id="532" name="Inner QUIC Connection"/>
+          <p:cNvSpPr txBox="1"/>
+          <p:nvPr/>
+        </p:nvSpPr>
+        <p:spPr>
+          <a:xfrm>
+            <a:off x="5355309" y="4543425"/>
+            <a:ext cx="1803443" cy="249801"/>
+          </a:xfrm>
+          <a:prstGeom prst="rect">
+            <a:avLst/>
+          </a:prstGeom>
+          <a:ln w="12700">
+            <a:miter lim="400000"/>
+          </a:ln>
+          <a:extLst>
+            <a:ext uri="{C572A759-6A51-4108-AA02-DFA0A04FC94B}">
+              <ma14:wrappingTextBoxFlag xmlns:ma14="http://schemas.microsoft.com/office/mac/drawingml/2011/main" xmlns:a14="http://schemas.microsoft.com/office/drawing/2010/main" xmlns:m="http://schemas.openxmlformats.org/officeDocument/2006/math" xmlns="" val="1"/>
+            </a:ext>
+          </a:extLst>
+        </p:spPr>
+        <p:txBody>
+          <a:bodyPr wrap="none" lIns="36000" tIns="36000" rIns="36000" bIns="36000">
+            <a:spAutoFit/>
+          </a:bodyPr>
+          <a:lstStyle>
+            <a:lvl1pPr>
+              <a:defRPr sz="1200" b="1">
+                <a:solidFill>
+                  <a:srgbClr val="FFFFFF"/>
+                </a:solidFill>
+              </a:defRPr>
+            </a:lvl1pPr>
+          </a:lstStyle>
+          <a:p>
+            <a:r>
+              <a:t>Inner QUIC Connection </a:t>
+            </a:r>
           </a:p>
         </p:txBody>
       </p:sp>
     </p:spTree>
     <p:extLst>
       <p:ext uri="{BB962C8B-B14F-4D97-AF65-F5344CB8AC3E}">
-        <p14:creationId xmlns:p14="http://schemas.microsoft.com/office/powerpoint/2010/main" val="4019386652"/>
+        <p14:creationId xmlns:p14="http://schemas.microsoft.com/office/powerpoint/2010/main" val="3798658593"/>
       </p:ext>
     </p:extLst>
   </p:cSld>
   <p:clrMapOvr>
     <a:masterClrMapping/>
   </p:clrMapOvr>
+  <p:transition spd="med"/>
 </p:sld>
 </file>
 
@@ -22525,225 +23652,2047 @@
       </p:grpSpPr>
       <p:sp>
         <p:nvSpPr>
-          <p:cNvPr id="2" name="Title 1">
-            <a:extLst>
-              <a:ext uri="{FF2B5EF4-FFF2-40B4-BE49-F238E27FC236}">
-                <a16:creationId xmlns:a16="http://schemas.microsoft.com/office/drawing/2014/main" id="{6E3AA9DB-3927-6D4E-B4A4-80F7254BC85A}"/>
-              </a:ext>
-            </a:extLst>
-          </p:cNvPr>
-          <p:cNvSpPr>
+          <p:cNvPr id="534" name="Title 1"/>
+          <p:cNvSpPr txBox="1">
             <a:spLocks noGrp="1"/>
           </p:cNvSpPr>
           <p:nvPr>
             <p:ph type="title"/>
           </p:nvPr>
         </p:nvSpPr>
-        <p:spPr/>
+        <p:spPr>
+          <a:xfrm>
+            <a:off x="479425" y="476250"/>
+            <a:ext cx="8353426" cy="1081088"/>
+          </a:xfrm>
+          <a:prstGeom prst="rect">
+            <a:avLst/>
+          </a:prstGeom>
+        </p:spPr>
         <p:txBody>
           <a:bodyPr/>
-          <a:lstStyle/>
-          <a:p>
-            <a:r>
-              <a:rPr lang="en-US" dirty="0"/>
-              <a:t>Drafts</a:t>
+          <a:lstStyle>
+            <a:lvl1pPr>
+              <a:defRPr b="1" spc="-200"/>
+            </a:lvl1pPr>
+          </a:lstStyle>
+          <a:p>
+            <a:r>
+              <a:t>Advanced Support of User Agents</a:t>
             </a:r>
           </a:p>
         </p:txBody>
       </p:sp>
       <p:sp>
         <p:nvSpPr>
-          <p:cNvPr id="3" name="Content Placeholder 2">
-            <a:extLst>
-              <a:ext uri="{FF2B5EF4-FFF2-40B4-BE49-F238E27FC236}">
-                <a16:creationId xmlns:a16="http://schemas.microsoft.com/office/drawing/2014/main" id="{827C647E-30BE-0A41-B3BC-64D9BA88D4E5}"/>
-              </a:ext>
-            </a:extLst>
-          </p:cNvPr>
-          <p:cNvSpPr>
+          <p:cNvPr id="535" name="Content Placeholder 2"/>
+          <p:cNvSpPr txBox="1">
             <a:spLocks noGrp="1"/>
           </p:cNvSpPr>
           <p:nvPr>
-            <p:ph sz="quarter" idx="10"/>
+            <p:ph type="body" sz="quarter" idx="1"/>
           </p:nvPr>
         </p:nvSpPr>
-        <p:spPr/>
+        <p:spPr>
+          <a:xfrm>
+            <a:off x="479424" y="1844675"/>
+            <a:ext cx="11277148" cy="1081088"/>
+          </a:xfrm>
+          <a:prstGeom prst="rect">
+            <a:avLst/>
+          </a:prstGeom>
+        </p:spPr>
         <p:txBody>
-          <a:bodyPr/>
+          <a:bodyPr>
+            <a:normAutofit/>
+          </a:bodyPr>
           <a:lstStyle/>
           <a:p>
-            <a:r>
-              <a:rPr lang="de-DE" dirty="0"/>
-              <a:t>QUIC </a:t>
-            </a:r>
-            <a:r>
-              <a:rPr lang="de-DE" dirty="0" err="1"/>
-              <a:t>as</a:t>
-            </a:r>
-            <a:r>
-              <a:rPr lang="de-DE" dirty="0"/>
-              <a:t> a Substrate - </a:t>
-            </a:r>
-            <a:r>
-              <a:rPr lang="de-DE" dirty="0">
-                <a:hlinkClick r:id="rId2"/>
-              </a:rPr>
-              <a:t>https://tools.ietf.org/html/draft-kuehlewind-quic-substrate-00</a:t>
-            </a:r>
-            <a:endParaRPr lang="en-US" altLang="en-US" dirty="0"/>
-          </a:p>
-          <a:p>
-            <a:r>
-              <a:rPr lang="en-US" altLang="en-US" dirty="0"/>
-              <a:t>MASQUE - </a:t>
-            </a:r>
-            <a:r>
-              <a:rPr lang="en-US" altLang="en-US" dirty="0">
-                <a:hlinkClick r:id="rId3"/>
-              </a:rPr>
-              <a:t>https://tools.ietf.org/html/draft-schinazi-masque</a:t>
-            </a:r>
-            <a:r>
-              <a:rPr lang="en-US" altLang="en-US" dirty="0"/>
-              <a:t> </a:t>
-            </a:r>
-          </a:p>
-          <a:p>
-            <a:r>
-              <a:rPr lang="de-DE" dirty="0"/>
-              <a:t>HTTP Transport Authentication - </a:t>
-            </a:r>
-            <a:r>
-              <a:rPr lang="de-DE" dirty="0">
-                <a:hlinkClick r:id="rId4"/>
-              </a:rPr>
-              <a:t>https://tools.ietf.org/html/draft-schinazi-httpbis-transport-auth-00</a:t>
-            </a:r>
-            <a:endParaRPr lang="en-US" altLang="en-US" dirty="0"/>
-          </a:p>
-          <a:p>
-            <a:endParaRPr lang="en-US" altLang="en-US" dirty="0"/>
-          </a:p>
-          <a:p>
-            <a:r>
-              <a:rPr lang="en-US" altLang="en-US" dirty="0"/>
-              <a:t>Also, previous and related drafts:</a:t>
-            </a:r>
-          </a:p>
-          <a:p>
-            <a:pPr lvl="1"/>
-            <a:r>
-              <a:rPr lang="en-US" altLang="en-US" dirty="0"/>
-              <a:t>HELLIUM - </a:t>
-            </a:r>
-            <a:r>
-              <a:rPr lang="en-US" altLang="en-US" dirty="0">
-                <a:hlinkClick r:id="rId5"/>
-              </a:rPr>
-              <a:t>https://tools.ietf.org/html/draft-schwartz-httpbis-helium</a:t>
-            </a:r>
-            <a:r>
-              <a:rPr lang="en-US" altLang="en-US" dirty="0"/>
-              <a:t> </a:t>
-            </a:r>
-          </a:p>
-          <a:p>
-            <a:pPr lvl="1"/>
-            <a:r>
-              <a:rPr lang="en-US" altLang="en-US" dirty="0"/>
-              <a:t>HINT - </a:t>
-            </a:r>
-            <a:r>
-              <a:rPr lang="en-US" altLang="en-US" dirty="0">
-                <a:hlinkClick r:id="rId6"/>
-              </a:rPr>
-              <a:t>https://tools.ietf.org/html/draft-pardue-httpbis-http-network-tunnelling</a:t>
-            </a:r>
-            <a:r>
-              <a:rPr lang="en-US" altLang="en-US" dirty="0"/>
-              <a:t> </a:t>
-            </a:r>
-          </a:p>
-          <a:p>
-            <a:pPr lvl="1"/>
-            <a:r>
-              <a:rPr lang="en-US" altLang="en-US" dirty="0"/>
-              <a:t>QUIC Datagram - </a:t>
-            </a:r>
-            <a:r>
-              <a:rPr lang="en-US" altLang="en-US" dirty="0">
-                <a:hlinkClick r:id="rId7"/>
-              </a:rPr>
-              <a:t>https://tools.ietf.org/html/draft-pauly-quic-datagram</a:t>
-            </a:r>
-            <a:endParaRPr lang="en-US" altLang="en-US" dirty="0"/>
-          </a:p>
-          <a:p>
-            <a:pPr marL="0" indent="0">
-              <a:buNone/>
+            <a:pPr>
+              <a:defRPr sz="1800" spc="-100"/>
             </a:pPr>
-            <a:endParaRPr lang="en-US" dirty="0"/>
+            <a:r>
+              <a:rPr dirty="0"/>
+              <a:t>Proxy provides additional functionality (located "close" to the client e.g. access network)</a:t>
+            </a:r>
+          </a:p>
+          <a:p>
+            <a:pPr>
+              <a:defRPr sz="1800" spc="-100"/>
+            </a:pPr>
+            <a:r>
+              <a:rPr dirty="0"/>
+              <a:t>Clients request function and may provide information to the proxy; optionally server can be aware</a:t>
+            </a:r>
+          </a:p>
+        </p:txBody>
+      </p:sp>
+      <p:grpSp>
+        <p:nvGrpSpPr>
+          <p:cNvPr id="539" name="Group"/>
+          <p:cNvGrpSpPr/>
+          <p:nvPr/>
+        </p:nvGrpSpPr>
+        <p:grpSpPr>
+          <a:xfrm>
+            <a:off x="2739164" y="4046972"/>
+            <a:ext cx="4394191" cy="870222"/>
+            <a:chOff x="0" y="0"/>
+            <a:chExt cx="4394189" cy="870221"/>
+          </a:xfrm>
+        </p:grpSpPr>
+        <p:sp>
+          <p:nvSpPr>
+            <p:cNvPr id="536" name="Rectangle"/>
+            <p:cNvSpPr/>
+            <p:nvPr/>
+          </p:nvSpPr>
+          <p:spPr>
+            <a:xfrm>
+              <a:off x="158888" y="0"/>
+              <a:ext cx="4055716" cy="870222"/>
+            </a:xfrm>
+            <a:prstGeom prst="rect">
+              <a:avLst/>
+            </a:prstGeom>
+            <a:solidFill>
+              <a:srgbClr val="3980E8"/>
+            </a:solidFill>
+            <a:ln w="12700" cap="flat">
+              <a:noFill/>
+              <a:miter lim="400000"/>
+            </a:ln>
+            <a:effectLst/>
+          </p:spPr>
+          <p:txBody>
+            <a:bodyPr wrap="square" lIns="36000" tIns="36000" rIns="36000" bIns="36000" numCol="1" anchor="t">
+              <a:noAutofit/>
+            </a:bodyPr>
+            <a:lstStyle/>
+            <a:p>
+              <a:endParaRPr/>
+            </a:p>
+          </p:txBody>
+        </p:sp>
+        <p:sp>
+          <p:nvSpPr>
+            <p:cNvPr id="537" name="Oval"/>
+            <p:cNvSpPr/>
+            <p:nvPr/>
+          </p:nvSpPr>
+          <p:spPr>
+            <a:xfrm>
+              <a:off x="4019688" y="0"/>
+              <a:ext cx="374502" cy="870222"/>
+            </a:xfrm>
+            <a:prstGeom prst="ellipse">
+              <a:avLst/>
+            </a:prstGeom>
+            <a:solidFill>
+              <a:srgbClr val="3980E8"/>
+            </a:solidFill>
+            <a:ln w="12700" cap="flat">
+              <a:noFill/>
+              <a:miter lim="400000"/>
+            </a:ln>
+            <a:effectLst/>
+          </p:spPr>
+          <p:txBody>
+            <a:bodyPr wrap="square" lIns="36000" tIns="36000" rIns="36000" bIns="36000" numCol="1" anchor="t">
+              <a:noAutofit/>
+            </a:bodyPr>
+            <a:lstStyle/>
+            <a:p>
+              <a:endParaRPr/>
+            </a:p>
+          </p:txBody>
+        </p:sp>
+        <p:sp>
+          <p:nvSpPr>
+            <p:cNvPr id="538" name="Oval"/>
+            <p:cNvSpPr/>
+            <p:nvPr/>
+          </p:nvSpPr>
+          <p:spPr>
+            <a:xfrm>
+              <a:off x="0" y="0"/>
+              <a:ext cx="374502" cy="870222"/>
+            </a:xfrm>
+            <a:prstGeom prst="ellipse">
+              <a:avLst/>
+            </a:prstGeom>
+            <a:solidFill>
+              <a:srgbClr val="FFFFFF"/>
+            </a:solidFill>
+            <a:ln w="12700" cap="flat">
+              <a:noFill/>
+              <a:miter lim="400000"/>
+            </a:ln>
+            <a:effectLst/>
+          </p:spPr>
+          <p:txBody>
+            <a:bodyPr wrap="square" lIns="36000" tIns="36000" rIns="36000" bIns="36000" numCol="1" anchor="t">
+              <a:noAutofit/>
+            </a:bodyPr>
+            <a:lstStyle/>
+            <a:p>
+              <a:endParaRPr/>
+            </a:p>
+          </p:txBody>
+        </p:sp>
+      </p:grpSp>
+      <p:sp>
+        <p:nvSpPr>
+          <p:cNvPr id="540" name="Notebook"/>
+          <p:cNvSpPr/>
+          <p:nvPr/>
+        </p:nvSpPr>
+        <p:spPr>
+          <a:xfrm>
+            <a:off x="1111690" y="4059672"/>
+            <a:ext cx="1508171" cy="844822"/>
+          </a:xfrm>
+          <a:custGeom>
+            <a:avLst/>
+            <a:gdLst/>
+            <a:ahLst/>
+            <a:cxnLst>
+              <a:cxn ang="0">
+                <a:pos x="wd2" y="hd2"/>
+              </a:cxn>
+              <a:cxn ang="5400000">
+                <a:pos x="wd2" y="hd2"/>
+              </a:cxn>
+              <a:cxn ang="10800000">
+                <a:pos x="wd2" y="hd2"/>
+              </a:cxn>
+              <a:cxn ang="16200000">
+                <a:pos x="wd2" y="hd2"/>
+              </a:cxn>
+            </a:cxnLst>
+            <a:rect l="0" t="0" r="r" b="b"/>
+            <a:pathLst>
+              <a:path w="21600" h="21599" extrusionOk="0">
+                <a:moveTo>
+                  <a:pt x="1952" y="0"/>
+                </a:moveTo>
+                <a:cubicBezTo>
+                  <a:pt x="1421" y="0"/>
+                  <a:pt x="1439" y="771"/>
+                  <a:pt x="1439" y="1718"/>
+                </a:cubicBezTo>
+                <a:lnTo>
+                  <a:pt x="1439" y="19328"/>
+                </a:lnTo>
+                <a:lnTo>
+                  <a:pt x="0" y="19328"/>
+                </a:lnTo>
+                <a:cubicBezTo>
+                  <a:pt x="0" y="19328"/>
+                  <a:pt x="0" y="19890"/>
+                  <a:pt x="0" y="20529"/>
+                </a:cubicBezTo>
+                <a:cubicBezTo>
+                  <a:pt x="0" y="21600"/>
+                  <a:pt x="190" y="21599"/>
+                  <a:pt x="896" y="21599"/>
+                </a:cubicBezTo>
+                <a:lnTo>
+                  <a:pt x="10332" y="21599"/>
+                </a:lnTo>
+                <a:lnTo>
+                  <a:pt x="11268" y="21599"/>
+                </a:lnTo>
+                <a:lnTo>
+                  <a:pt x="20704" y="21599"/>
+                </a:lnTo>
+                <a:cubicBezTo>
+                  <a:pt x="21367" y="21599"/>
+                  <a:pt x="21600" y="21600"/>
+                  <a:pt x="21600" y="20529"/>
+                </a:cubicBezTo>
+                <a:cubicBezTo>
+                  <a:pt x="21600" y="19890"/>
+                  <a:pt x="21600" y="19328"/>
+                  <a:pt x="21600" y="19328"/>
+                </a:cubicBezTo>
+                <a:lnTo>
+                  <a:pt x="20161" y="19328"/>
+                </a:lnTo>
+                <a:lnTo>
+                  <a:pt x="20161" y="1718"/>
+                </a:lnTo>
+                <a:cubicBezTo>
+                  <a:pt x="20161" y="771"/>
+                  <a:pt x="20196" y="0"/>
+                  <a:pt x="19665" y="0"/>
+                </a:cubicBezTo>
+                <a:lnTo>
+                  <a:pt x="1952" y="0"/>
+                </a:lnTo>
+                <a:close/>
+                <a:moveTo>
+                  <a:pt x="2475" y="1849"/>
+                </a:moveTo>
+                <a:lnTo>
+                  <a:pt x="19125" y="1849"/>
+                </a:lnTo>
+                <a:lnTo>
+                  <a:pt x="19125" y="19328"/>
+                </a:lnTo>
+                <a:lnTo>
+                  <a:pt x="11268" y="19328"/>
+                </a:lnTo>
+                <a:lnTo>
+                  <a:pt x="10332" y="19328"/>
+                </a:lnTo>
+                <a:lnTo>
+                  <a:pt x="2475" y="19328"/>
+                </a:lnTo>
+                <a:lnTo>
+                  <a:pt x="2475" y="1849"/>
+                </a:lnTo>
+                <a:close/>
+              </a:path>
+            </a:pathLst>
+          </a:custGeom>
+          <a:solidFill>
+            <a:srgbClr val="FFFFFF"/>
+          </a:solidFill>
+          <a:ln w="25400">
+            <a:solidFill>
+              <a:schemeClr val="accent1"/>
+            </a:solidFill>
+          </a:ln>
+        </p:spPr>
+        <p:txBody>
+          <a:bodyPr lIns="36000" tIns="36000" rIns="36000" bIns="36000"/>
+          <a:lstStyle/>
+          <a:p>
+            <a:endParaRPr/>
           </a:p>
         </p:txBody>
       </p:sp>
       <p:sp>
         <p:nvSpPr>
-          <p:cNvPr id="4" name="TextBox 3">
-            <a:extLst>
-              <a:ext uri="{FF2B5EF4-FFF2-40B4-BE49-F238E27FC236}">
-                <a16:creationId xmlns:a16="http://schemas.microsoft.com/office/drawing/2014/main" id="{7AD0CDD8-A1AE-4648-A710-D2CA47030888}"/>
-              </a:ext>
-            </a:extLst>
-          </p:cNvPr>
+          <p:cNvPr id="541" name="Proxy"/>
+          <p:cNvSpPr/>
+          <p:nvPr/>
+        </p:nvSpPr>
+        <p:spPr>
+          <a:xfrm>
+            <a:off x="7357419" y="3997859"/>
+            <a:ext cx="1271957" cy="968448"/>
+          </a:xfrm>
+          <a:prstGeom prst="roundRect">
+            <a:avLst>
+              <a:gd name="adj" fmla="val 19701"/>
+            </a:avLst>
+          </a:prstGeom>
+          <a:solidFill>
+            <a:srgbClr val="FFFFFF"/>
+          </a:solidFill>
+          <a:ln w="25400">
+            <a:solidFill>
+              <a:schemeClr val="accent1"/>
+            </a:solidFill>
+          </a:ln>
+          <a:extLst>
+            <a:ext uri="{C572A759-6A51-4108-AA02-DFA0A04FC94B}">
+              <ma14:wrappingTextBoxFlag xmlns:ma14="http://schemas.microsoft.com/office/mac/drawingml/2011/main" xmlns:a14="http://schemas.microsoft.com/office/drawing/2010/main" xmlns:m="http://schemas.openxmlformats.org/officeDocument/2006/math" xmlns="" val="1"/>
+            </a:ext>
+          </a:extLst>
+        </p:spPr>
+        <p:txBody>
+          <a:bodyPr lIns="36000" tIns="36000" rIns="36000" bIns="36000" anchor="ctr"/>
+          <a:lstStyle>
+            <a:lvl1pPr algn="ctr"/>
+          </a:lstStyle>
+          <a:p>
+            <a:r>
+              <a:t>Proxy</a:t>
+            </a:r>
+          </a:p>
+        </p:txBody>
+      </p:sp>
+      <p:sp>
+        <p:nvSpPr>
+          <p:cNvPr id="542" name="Server"/>
+          <p:cNvSpPr/>
+          <p:nvPr/>
+        </p:nvSpPr>
+        <p:spPr>
+          <a:xfrm>
+            <a:off x="9499091" y="3462412"/>
+            <a:ext cx="1271956" cy="2039342"/>
+          </a:xfrm>
+          <a:prstGeom prst="roundRect">
+            <a:avLst>
+              <a:gd name="adj" fmla="val 15000"/>
+            </a:avLst>
+          </a:prstGeom>
+          <a:solidFill>
+            <a:srgbClr val="FFFFFF"/>
+          </a:solidFill>
+          <a:ln w="25400">
+            <a:solidFill>
+              <a:schemeClr val="accent1"/>
+            </a:solidFill>
+          </a:ln>
+          <a:extLst>
+            <a:ext uri="{C572A759-6A51-4108-AA02-DFA0A04FC94B}">
+              <ma14:wrappingTextBoxFlag xmlns:ma14="http://schemas.microsoft.com/office/mac/drawingml/2011/main" xmlns:a14="http://schemas.microsoft.com/office/drawing/2010/main" xmlns:m="http://schemas.openxmlformats.org/officeDocument/2006/math" xmlns="" val="1"/>
+            </a:ext>
+          </a:extLst>
+        </p:spPr>
+        <p:txBody>
+          <a:bodyPr lIns="36000" tIns="36000" rIns="36000" bIns="36000" anchor="ctr"/>
+          <a:lstStyle>
+            <a:lvl1pPr algn="ctr"/>
+          </a:lstStyle>
+          <a:p>
+            <a:r>
+              <a:t>Server</a:t>
+            </a:r>
+          </a:p>
+        </p:txBody>
+      </p:sp>
+      <p:sp>
+        <p:nvSpPr>
+          <p:cNvPr id="543" name="Traffic Adapting QUIC Substrate"/>
           <p:cNvSpPr txBox="1"/>
           <p:nvPr/>
         </p:nvSpPr>
-        <p:spPr bwMode="auto">
+        <p:spPr>
           <a:xfrm>
-            <a:off x="10960925" y="4690753"/>
-            <a:ext cx="0" cy="0"/>
+            <a:off x="3469397" y="4166701"/>
+            <a:ext cx="3337786" cy="351401"/>
           </a:xfrm>
           <a:prstGeom prst="rect">
             <a:avLst/>
           </a:prstGeom>
-          <a:noFill/>
           <a:ln w="12700">
-            <a:noFill/>
-            <a:miter lim="800000"/>
-            <a:headEnd/>
-            <a:tailEnd/>
+            <a:miter lim="400000"/>
+          </a:ln>
+          <a:extLst>
+            <a:ext uri="{C572A759-6A51-4108-AA02-DFA0A04FC94B}">
+              <ma14:wrappingTextBoxFlag xmlns:ma14="http://schemas.microsoft.com/office/mac/drawingml/2011/main" xmlns:a14="http://schemas.microsoft.com/office/drawing/2010/main" xmlns:m="http://schemas.openxmlformats.org/officeDocument/2006/math" xmlns="" val="1"/>
+            </a:ext>
+          </a:extLst>
+        </p:spPr>
+        <p:txBody>
+          <a:bodyPr wrap="none" lIns="36000" tIns="36000" rIns="36000" bIns="36000">
+            <a:spAutoFit/>
+          </a:bodyPr>
+          <a:lstStyle>
+            <a:lvl1pPr>
+              <a:defRPr>
+                <a:solidFill>
+                  <a:srgbClr val="FFFFFF"/>
+                </a:solidFill>
+              </a:defRPr>
+            </a:lvl1pPr>
+          </a:lstStyle>
+          <a:p>
+            <a:r>
+              <a:t>Traffic Adapting QUIC Substrate</a:t>
+            </a:r>
+          </a:p>
+        </p:txBody>
+      </p:sp>
+      <p:sp>
+        <p:nvSpPr>
+          <p:cNvPr id="544" name="Line"/>
+          <p:cNvSpPr/>
+          <p:nvPr/>
+        </p:nvSpPr>
+        <p:spPr>
+          <a:xfrm>
+            <a:off x="2528545" y="4668325"/>
+            <a:ext cx="6952648" cy="1"/>
+          </a:xfrm>
+          <a:prstGeom prst="line">
+            <a:avLst/>
+          </a:prstGeom>
+          <a:ln w="254000">
+            <a:solidFill>
+              <a:srgbClr val="EBA281"/>
+            </a:solidFill>
           </a:ln>
         </p:spPr>
         <p:txBody>
-          <a:bodyPr vert="horz" wrap="none" lIns="72000" tIns="36000" rIns="73152" bIns="36576" numCol="1" rtlCol="0" anchor="t" anchorCtr="0" compatLnSpc="1">
-            <a:prstTxWarp prst="textNoShape">
-              <a:avLst/>
-            </a:prstTxWarp>
-            <a:noAutofit/>
+          <a:bodyPr lIns="45719" rIns="45719"/>
+          <a:lstStyle/>
+          <a:p>
+            <a:endParaRPr/>
+          </a:p>
+        </p:txBody>
+      </p:sp>
+      <p:sp>
+        <p:nvSpPr>
+          <p:cNvPr id="545" name="Inner QUIC Connection"/>
+          <p:cNvSpPr txBox="1"/>
+          <p:nvPr/>
+        </p:nvSpPr>
+        <p:spPr>
+          <a:xfrm>
+            <a:off x="5355309" y="4543425"/>
+            <a:ext cx="1803443" cy="249801"/>
+          </a:xfrm>
+          <a:prstGeom prst="rect">
+            <a:avLst/>
+          </a:prstGeom>
+          <a:ln w="12700">
+            <a:miter lim="400000"/>
+          </a:ln>
+          <a:extLst>
+            <a:ext uri="{C572A759-6A51-4108-AA02-DFA0A04FC94B}">
+              <ma14:wrappingTextBoxFlag xmlns:ma14="http://schemas.microsoft.com/office/mac/drawingml/2011/main" xmlns:a14="http://schemas.microsoft.com/office/drawing/2010/main" xmlns:m="http://schemas.openxmlformats.org/officeDocument/2006/math" xmlns="" val="1"/>
+            </a:ext>
+          </a:extLst>
+        </p:spPr>
+        <p:txBody>
+          <a:bodyPr wrap="none" lIns="36000" tIns="36000" rIns="36000" bIns="36000">
+            <a:spAutoFit/>
+          </a:bodyPr>
+          <a:lstStyle>
+            <a:lvl1pPr>
+              <a:defRPr sz="1200" b="1">
+                <a:solidFill>
+                  <a:srgbClr val="FFFFFF"/>
+                </a:solidFill>
+              </a:defRPr>
+            </a:lvl1pPr>
+          </a:lstStyle>
+          <a:p>
+            <a:r>
+              <a:t>Inner QUIC Connection </a:t>
+            </a:r>
+          </a:p>
+        </p:txBody>
+      </p:sp>
+      <p:sp>
+        <p:nvSpPr>
+          <p:cNvPr id="546" name="Policy…"/>
+          <p:cNvSpPr txBox="1"/>
+          <p:nvPr/>
+        </p:nvSpPr>
+        <p:spPr>
+          <a:xfrm>
+            <a:off x="7303031" y="5446076"/>
+            <a:ext cx="1380733" cy="630801"/>
+          </a:xfrm>
+          <a:prstGeom prst="rect">
+            <a:avLst/>
+          </a:prstGeom>
+          <a:ln w="12700">
+            <a:miter lim="400000"/>
+          </a:ln>
+          <a:extLst>
+            <a:ext uri="{C572A759-6A51-4108-AA02-DFA0A04FC94B}">
+              <ma14:wrappingTextBoxFlag xmlns:ma14="http://schemas.microsoft.com/office/mac/drawingml/2011/main" xmlns:a14="http://schemas.microsoft.com/office/drawing/2010/main" xmlns:m="http://schemas.openxmlformats.org/officeDocument/2006/math" xmlns="" val="1"/>
+            </a:ext>
+          </a:extLst>
+        </p:spPr>
+        <p:txBody>
+          <a:bodyPr wrap="none" lIns="36000" tIns="36000" rIns="36000" bIns="36000">
+            <a:spAutoFit/>
           </a:bodyPr>
           <a:lstStyle/>
           <a:p>
-            <a:pPr marL="344488" indent="-344488" algn="l">
-              <a:buClr>
-                <a:schemeClr val="tx1"/>
-              </a:buClr>
-              <a:buFont typeface="Ericsson Hilda Light" panose="00000400000000000000" pitchFamily="2" charset="0"/>
-              <a:buChar char="—"/>
+            <a:pPr algn="ctr">
+              <a:defRPr i="1">
+                <a:solidFill>
+                  <a:srgbClr val="000000"/>
+                </a:solidFill>
+              </a:defRPr>
             </a:pPr>
-            <a:endParaRPr lang="en-GB" sz="2000" dirty="0" err="1"/>
+            <a:r>
+              <a:t>Policy</a:t>
+            </a:r>
+          </a:p>
+          <a:p>
+            <a:pPr algn="ctr">
+              <a:defRPr i="1">
+                <a:solidFill>
+                  <a:srgbClr val="000000"/>
+                </a:solidFill>
+              </a:defRPr>
+            </a:pPr>
+            <a:r>
+              <a:t>Enforcement</a:t>
+            </a:r>
+          </a:p>
+        </p:txBody>
+      </p:sp>
+      <p:sp>
+        <p:nvSpPr>
+          <p:cNvPr id="547" name="Line"/>
+          <p:cNvSpPr/>
+          <p:nvPr/>
+        </p:nvSpPr>
+        <p:spPr>
+          <a:xfrm flipV="1">
+            <a:off x="7993397" y="4986149"/>
+            <a:ext cx="1" cy="455164"/>
+          </a:xfrm>
+          <a:prstGeom prst="line">
+            <a:avLst/>
+          </a:prstGeom>
+          <a:ln w="25400">
+            <a:solidFill>
+              <a:srgbClr val="000000"/>
+            </a:solidFill>
+            <a:prstDash val="sysDot"/>
+            <a:miter lim="400000"/>
+            <a:tailEnd type="triangle"/>
+          </a:ln>
+        </p:spPr>
+        <p:txBody>
+          <a:bodyPr lIns="45719" rIns="45719"/>
+          <a:lstStyle/>
+          <a:p>
+            <a:endParaRPr/>
           </a:p>
         </p:txBody>
       </p:sp>
     </p:spTree>
     <p:extLst>
       <p:ext uri="{BB962C8B-B14F-4D97-AF65-F5344CB8AC3E}">
-        <p14:creationId xmlns:p14="http://schemas.microsoft.com/office/powerpoint/2010/main" val="881592644"/>
+        <p14:creationId xmlns:p14="http://schemas.microsoft.com/office/powerpoint/2010/main" val="193336929"/>
       </p:ext>
     </p:extLst>
   </p:cSld>
   <p:clrMapOvr>
     <a:masterClrMapping/>
   </p:clrMapOvr>
+  <p:transition spd="med"/>
+</p:sld>
+</file>
+
+<file path=ppt/slides/slide8.xml><?xml version="1.0" encoding="utf-8"?>
+<p:sld xmlns:a="http://schemas.openxmlformats.org/drawingml/2006/main" xmlns:r="http://schemas.openxmlformats.org/officeDocument/2006/relationships" xmlns:p="http://schemas.openxmlformats.org/presentationml/2006/main">
+  <p:cSld>
+    <p:spTree>
+      <p:nvGrpSpPr>
+        <p:cNvPr id="1" name=""/>
+        <p:cNvGrpSpPr/>
+        <p:nvPr/>
+      </p:nvGrpSpPr>
+      <p:grpSpPr>
+        <a:xfrm>
+          <a:off x="0" y="0"/>
+          <a:ext cx="0" cy="0"/>
+          <a:chOff x="0" y="0"/>
+          <a:chExt cx="0" cy="0"/>
+        </a:xfrm>
+      </p:grpSpPr>
+      <p:sp>
+        <p:nvSpPr>
+          <p:cNvPr id="549" name="Line"/>
+          <p:cNvSpPr/>
+          <p:nvPr/>
+        </p:nvSpPr>
+        <p:spPr>
+          <a:xfrm>
+            <a:off x="8312838" y="4831208"/>
+            <a:ext cx="863414" cy="476843"/>
+          </a:xfrm>
+          <a:prstGeom prst="line">
+            <a:avLst/>
+          </a:prstGeom>
+          <a:ln w="25400">
+            <a:solidFill>
+              <a:schemeClr val="accent1"/>
+            </a:solidFill>
+          </a:ln>
+        </p:spPr>
+        <p:txBody>
+          <a:bodyPr lIns="45719" rIns="45719"/>
+          <a:lstStyle/>
+          <a:p>
+            <a:endParaRPr/>
+          </a:p>
+        </p:txBody>
+      </p:sp>
+      <p:sp>
+        <p:nvSpPr>
+          <p:cNvPr id="550" name="Title 1"/>
+          <p:cNvSpPr txBox="1">
+            <a:spLocks noGrp="1"/>
+          </p:cNvSpPr>
+          <p:nvPr>
+            <p:ph type="title"/>
+          </p:nvPr>
+        </p:nvSpPr>
+        <p:spPr>
+          <a:xfrm>
+            <a:off x="479425" y="476250"/>
+            <a:ext cx="8353426" cy="1081088"/>
+          </a:xfrm>
+          <a:prstGeom prst="rect">
+            <a:avLst/>
+          </a:prstGeom>
+        </p:spPr>
+        <p:txBody>
+          <a:bodyPr/>
+          <a:lstStyle>
+            <a:lvl1pPr defTabSz="841247">
+              <a:spcBef>
+                <a:spcPts val="200"/>
+              </a:spcBef>
+              <a:defRPr sz="3680" b="1" spc="-184"/>
+            </a:lvl1pPr>
+          </a:lstStyle>
+          <a:p>
+            <a:r>
+              <a:rPr dirty="0"/>
+              <a:t>Frontend Support for Load Balancing and Migration/Mobility</a:t>
+            </a:r>
+          </a:p>
+        </p:txBody>
+      </p:sp>
+      <p:sp>
+        <p:nvSpPr>
+          <p:cNvPr id="551" name="Content Placeholder 2"/>
+          <p:cNvSpPr txBox="1">
+            <a:spLocks noGrp="1"/>
+          </p:cNvSpPr>
+          <p:nvPr>
+            <p:ph type="body" idx="1"/>
+          </p:nvPr>
+        </p:nvSpPr>
+        <p:spPr>
+          <a:xfrm>
+            <a:off x="479424" y="1844675"/>
+            <a:ext cx="11277148" cy="4392613"/>
+          </a:xfrm>
+          <a:prstGeom prst="rect">
+            <a:avLst/>
+          </a:prstGeom>
+        </p:spPr>
+        <p:txBody>
+          <a:bodyPr/>
+          <a:lstStyle/>
+          <a:p>
+            <a:pPr>
+              <a:defRPr sz="1800" spc="-100"/>
+            </a:pPr>
+            <a:r>
+              <a:rPr dirty="0"/>
+              <a:t>(Reverse) proxy may or may not be under the the same administrative domain as the service provider</a:t>
+            </a:r>
+          </a:p>
+          <a:p>
+            <a:pPr>
+              <a:defRPr sz="1800" spc="-100"/>
+            </a:pPr>
+            <a:r>
+              <a:rPr dirty="0"/>
+              <a:t>Proxy supports load balancing and/or mobility without terminating the e2e/app security association </a:t>
+            </a:r>
+          </a:p>
+          <a:p>
+            <a:pPr>
+              <a:defRPr b="1" spc="-100"/>
+            </a:pPr>
+            <a:r>
+              <a:rPr dirty="0"/>
+              <a:t>IoT Gateways</a:t>
+            </a:r>
+          </a:p>
+        </p:txBody>
+      </p:sp>
+      <p:grpSp>
+        <p:nvGrpSpPr>
+          <p:cNvPr id="555" name="Group"/>
+          <p:cNvGrpSpPr/>
+          <p:nvPr/>
+        </p:nvGrpSpPr>
+        <p:grpSpPr>
+          <a:xfrm>
+            <a:off x="2424880" y="4291415"/>
+            <a:ext cx="4394191" cy="870222"/>
+            <a:chOff x="0" y="0"/>
+            <a:chExt cx="4394189" cy="870221"/>
+          </a:xfrm>
+        </p:grpSpPr>
+        <p:sp>
+          <p:nvSpPr>
+            <p:cNvPr id="552" name="Rectangle"/>
+            <p:cNvSpPr/>
+            <p:nvPr/>
+          </p:nvSpPr>
+          <p:spPr>
+            <a:xfrm>
+              <a:off x="158888" y="0"/>
+              <a:ext cx="4055716" cy="870222"/>
+            </a:xfrm>
+            <a:prstGeom prst="rect">
+              <a:avLst/>
+            </a:prstGeom>
+            <a:solidFill>
+              <a:srgbClr val="3980E8"/>
+            </a:solidFill>
+            <a:ln w="12700" cap="flat">
+              <a:noFill/>
+              <a:miter lim="400000"/>
+            </a:ln>
+            <a:effectLst/>
+          </p:spPr>
+          <p:txBody>
+            <a:bodyPr wrap="square" lIns="36000" tIns="36000" rIns="36000" bIns="36000" numCol="1" anchor="t">
+              <a:noAutofit/>
+            </a:bodyPr>
+            <a:lstStyle/>
+            <a:p>
+              <a:endParaRPr/>
+            </a:p>
+          </p:txBody>
+        </p:sp>
+        <p:sp>
+          <p:nvSpPr>
+            <p:cNvPr id="553" name="Oval"/>
+            <p:cNvSpPr/>
+            <p:nvPr/>
+          </p:nvSpPr>
+          <p:spPr>
+            <a:xfrm>
+              <a:off x="4019688" y="0"/>
+              <a:ext cx="374502" cy="870222"/>
+            </a:xfrm>
+            <a:prstGeom prst="ellipse">
+              <a:avLst/>
+            </a:prstGeom>
+            <a:solidFill>
+              <a:srgbClr val="3980E8"/>
+            </a:solidFill>
+            <a:ln w="12700" cap="flat">
+              <a:noFill/>
+              <a:miter lim="400000"/>
+            </a:ln>
+            <a:effectLst/>
+          </p:spPr>
+          <p:txBody>
+            <a:bodyPr wrap="square" lIns="36000" tIns="36000" rIns="36000" bIns="36000" numCol="1" anchor="t">
+              <a:noAutofit/>
+            </a:bodyPr>
+            <a:lstStyle/>
+            <a:p>
+              <a:endParaRPr/>
+            </a:p>
+          </p:txBody>
+        </p:sp>
+        <p:sp>
+          <p:nvSpPr>
+            <p:cNvPr id="554" name="Oval"/>
+            <p:cNvSpPr/>
+            <p:nvPr/>
+          </p:nvSpPr>
+          <p:spPr>
+            <a:xfrm>
+              <a:off x="0" y="0"/>
+              <a:ext cx="374502" cy="870222"/>
+            </a:xfrm>
+            <a:prstGeom prst="ellipse">
+              <a:avLst/>
+            </a:prstGeom>
+            <a:solidFill>
+              <a:srgbClr val="FFFFFF"/>
+            </a:solidFill>
+            <a:ln w="12700" cap="flat">
+              <a:noFill/>
+              <a:miter lim="400000"/>
+            </a:ln>
+            <a:effectLst/>
+          </p:spPr>
+          <p:txBody>
+            <a:bodyPr wrap="square" lIns="36000" tIns="36000" rIns="36000" bIns="36000" numCol="1" anchor="t">
+              <a:noAutofit/>
+            </a:bodyPr>
+            <a:lstStyle/>
+            <a:p>
+              <a:endParaRPr/>
+            </a:p>
+          </p:txBody>
+        </p:sp>
+      </p:grpSp>
+      <p:sp>
+        <p:nvSpPr>
+          <p:cNvPr id="556" name="Notebook"/>
+          <p:cNvSpPr/>
+          <p:nvPr/>
+        </p:nvSpPr>
+        <p:spPr>
+          <a:xfrm>
+            <a:off x="797406" y="4304115"/>
+            <a:ext cx="1508171" cy="844822"/>
+          </a:xfrm>
+          <a:custGeom>
+            <a:avLst/>
+            <a:gdLst/>
+            <a:ahLst/>
+            <a:cxnLst>
+              <a:cxn ang="0">
+                <a:pos x="wd2" y="hd2"/>
+              </a:cxn>
+              <a:cxn ang="5400000">
+                <a:pos x="wd2" y="hd2"/>
+              </a:cxn>
+              <a:cxn ang="10800000">
+                <a:pos x="wd2" y="hd2"/>
+              </a:cxn>
+              <a:cxn ang="16200000">
+                <a:pos x="wd2" y="hd2"/>
+              </a:cxn>
+            </a:cxnLst>
+            <a:rect l="0" t="0" r="r" b="b"/>
+            <a:pathLst>
+              <a:path w="21600" h="21599" extrusionOk="0">
+                <a:moveTo>
+                  <a:pt x="1952" y="0"/>
+                </a:moveTo>
+                <a:cubicBezTo>
+                  <a:pt x="1421" y="0"/>
+                  <a:pt x="1439" y="771"/>
+                  <a:pt x="1439" y="1718"/>
+                </a:cubicBezTo>
+                <a:lnTo>
+                  <a:pt x="1439" y="19328"/>
+                </a:lnTo>
+                <a:lnTo>
+                  <a:pt x="0" y="19328"/>
+                </a:lnTo>
+                <a:cubicBezTo>
+                  <a:pt x="0" y="19328"/>
+                  <a:pt x="0" y="19890"/>
+                  <a:pt x="0" y="20529"/>
+                </a:cubicBezTo>
+                <a:cubicBezTo>
+                  <a:pt x="0" y="21600"/>
+                  <a:pt x="190" y="21599"/>
+                  <a:pt x="896" y="21599"/>
+                </a:cubicBezTo>
+                <a:lnTo>
+                  <a:pt x="10332" y="21599"/>
+                </a:lnTo>
+                <a:lnTo>
+                  <a:pt x="11268" y="21599"/>
+                </a:lnTo>
+                <a:lnTo>
+                  <a:pt x="20704" y="21599"/>
+                </a:lnTo>
+                <a:cubicBezTo>
+                  <a:pt x="21367" y="21599"/>
+                  <a:pt x="21600" y="21600"/>
+                  <a:pt x="21600" y="20529"/>
+                </a:cubicBezTo>
+                <a:cubicBezTo>
+                  <a:pt x="21600" y="19890"/>
+                  <a:pt x="21600" y="19328"/>
+                  <a:pt x="21600" y="19328"/>
+                </a:cubicBezTo>
+                <a:lnTo>
+                  <a:pt x="20161" y="19328"/>
+                </a:lnTo>
+                <a:lnTo>
+                  <a:pt x="20161" y="1718"/>
+                </a:lnTo>
+                <a:cubicBezTo>
+                  <a:pt x="20161" y="771"/>
+                  <a:pt x="20196" y="0"/>
+                  <a:pt x="19665" y="0"/>
+                </a:cubicBezTo>
+                <a:lnTo>
+                  <a:pt x="1952" y="0"/>
+                </a:lnTo>
+                <a:close/>
+                <a:moveTo>
+                  <a:pt x="2475" y="1849"/>
+                </a:moveTo>
+                <a:lnTo>
+                  <a:pt x="19125" y="1849"/>
+                </a:lnTo>
+                <a:lnTo>
+                  <a:pt x="19125" y="19328"/>
+                </a:lnTo>
+                <a:lnTo>
+                  <a:pt x="11268" y="19328"/>
+                </a:lnTo>
+                <a:lnTo>
+                  <a:pt x="10332" y="19328"/>
+                </a:lnTo>
+                <a:lnTo>
+                  <a:pt x="2475" y="19328"/>
+                </a:lnTo>
+                <a:lnTo>
+                  <a:pt x="2475" y="1849"/>
+                </a:lnTo>
+                <a:close/>
+              </a:path>
+            </a:pathLst>
+          </a:custGeom>
+          <a:solidFill>
+            <a:srgbClr val="FFFFFF"/>
+          </a:solidFill>
+          <a:ln w="25400">
+            <a:solidFill>
+              <a:schemeClr val="accent1"/>
+            </a:solidFill>
+          </a:ln>
+        </p:spPr>
+        <p:txBody>
+          <a:bodyPr lIns="36000" tIns="36000" rIns="36000" bIns="36000"/>
+          <a:lstStyle/>
+          <a:p>
+            <a:endParaRPr/>
+          </a:p>
+        </p:txBody>
+      </p:sp>
+      <p:sp>
+        <p:nvSpPr>
+          <p:cNvPr id="557" name="Load Balancer"/>
+          <p:cNvSpPr/>
+          <p:nvPr/>
+        </p:nvSpPr>
+        <p:spPr>
+          <a:xfrm>
+            <a:off x="7043135" y="3830714"/>
+            <a:ext cx="1271957" cy="1380037"/>
+          </a:xfrm>
+          <a:prstGeom prst="roundRect">
+            <a:avLst>
+              <a:gd name="adj" fmla="val 15000"/>
+            </a:avLst>
+          </a:prstGeom>
+          <a:solidFill>
+            <a:srgbClr val="FFFFFF"/>
+          </a:solidFill>
+          <a:ln w="25400">
+            <a:solidFill>
+              <a:schemeClr val="accent1"/>
+            </a:solidFill>
+          </a:ln>
+          <a:extLst>
+            <a:ext uri="{C572A759-6A51-4108-AA02-DFA0A04FC94B}">
+              <ma14:wrappingTextBoxFlag xmlns:ma14="http://schemas.microsoft.com/office/mac/drawingml/2011/main" xmlns:a14="http://schemas.microsoft.com/office/drawing/2010/main" xmlns:m="http://schemas.openxmlformats.org/officeDocument/2006/math" xmlns="" val="1"/>
+            </a:ext>
+          </a:extLst>
+        </p:spPr>
+        <p:txBody>
+          <a:bodyPr lIns="36000" tIns="36000" rIns="36000" bIns="36000" anchor="ctr"/>
+          <a:lstStyle>
+            <a:lvl1pPr algn="ctr"/>
+          </a:lstStyle>
+          <a:p>
+            <a:r>
+              <a:t>Load Balancer</a:t>
+            </a:r>
+          </a:p>
+        </p:txBody>
+      </p:sp>
+      <p:sp>
+        <p:nvSpPr>
+          <p:cNvPr id="558" name="Origin…"/>
+          <p:cNvSpPr/>
+          <p:nvPr/>
+        </p:nvSpPr>
+        <p:spPr>
+          <a:xfrm>
+            <a:off x="9184807" y="5045428"/>
+            <a:ext cx="1271956" cy="1224577"/>
+          </a:xfrm>
+          <a:prstGeom prst="roundRect">
+            <a:avLst>
+              <a:gd name="adj" fmla="val 15580"/>
+            </a:avLst>
+          </a:prstGeom>
+          <a:solidFill>
+            <a:srgbClr val="FFFFFF"/>
+          </a:solidFill>
+          <a:ln w="25400">
+            <a:solidFill>
+              <a:schemeClr val="accent1"/>
+            </a:solidFill>
+          </a:ln>
+          <a:extLst>
+            <a:ext uri="{C572A759-6A51-4108-AA02-DFA0A04FC94B}">
+              <ma14:wrappingTextBoxFlag xmlns:ma14="http://schemas.microsoft.com/office/mac/drawingml/2011/main" xmlns:a14="http://schemas.microsoft.com/office/drawing/2010/main" xmlns:m="http://schemas.openxmlformats.org/officeDocument/2006/math" xmlns="" val="1"/>
+            </a:ext>
+          </a:extLst>
+        </p:spPr>
+        <p:txBody>
+          <a:bodyPr lIns="36000" tIns="36000" rIns="36000" bIns="36000" anchor="ctr"/>
+          <a:lstStyle/>
+          <a:p>
+            <a:pPr algn="ctr"/>
+            <a:r>
+              <a:t>Origin</a:t>
+            </a:r>
+          </a:p>
+          <a:p>
+            <a:pPr algn="ctr"/>
+            <a:r>
+              <a:t>Server</a:t>
+            </a:r>
+          </a:p>
+        </p:txBody>
+      </p:sp>
+      <p:sp>
+        <p:nvSpPr>
+          <p:cNvPr id="559" name="Origin…"/>
+          <p:cNvSpPr/>
+          <p:nvPr/>
+        </p:nvSpPr>
+        <p:spPr>
+          <a:xfrm>
+            <a:off x="9184807" y="3286723"/>
+            <a:ext cx="1271956" cy="1224576"/>
+          </a:xfrm>
+          <a:prstGeom prst="roundRect">
+            <a:avLst>
+              <a:gd name="adj" fmla="val 15580"/>
+            </a:avLst>
+          </a:prstGeom>
+          <a:solidFill>
+            <a:srgbClr val="FFFFFF"/>
+          </a:solidFill>
+          <a:ln w="25400">
+            <a:solidFill>
+              <a:schemeClr val="accent1"/>
+            </a:solidFill>
+          </a:ln>
+          <a:extLst>
+            <a:ext uri="{C572A759-6A51-4108-AA02-DFA0A04FC94B}">
+              <ma14:wrappingTextBoxFlag xmlns:ma14="http://schemas.microsoft.com/office/mac/drawingml/2011/main" xmlns:a14="http://schemas.microsoft.com/office/drawing/2010/main" xmlns:m="http://schemas.openxmlformats.org/officeDocument/2006/math" xmlns="" val="1"/>
+            </a:ext>
+          </a:extLst>
+        </p:spPr>
+        <p:txBody>
+          <a:bodyPr lIns="36000" tIns="36000" rIns="36000" bIns="36000" anchor="ctr"/>
+          <a:lstStyle/>
+          <a:p>
+            <a:pPr algn="ctr"/>
+            <a:r>
+              <a:t>Origin</a:t>
+            </a:r>
+          </a:p>
+          <a:p>
+            <a:pPr algn="ctr"/>
+            <a:r>
+              <a:t>Server</a:t>
+            </a:r>
+          </a:p>
+        </p:txBody>
+      </p:sp>
+      <p:sp>
+        <p:nvSpPr>
+          <p:cNvPr id="561" name="Line"/>
+          <p:cNvSpPr/>
+          <p:nvPr/>
+        </p:nvSpPr>
+        <p:spPr>
+          <a:xfrm flipV="1">
+            <a:off x="8312838" y="3945283"/>
+            <a:ext cx="863414" cy="433002"/>
+          </a:xfrm>
+          <a:prstGeom prst="line">
+            <a:avLst/>
+          </a:prstGeom>
+          <a:ln w="25400">
+            <a:solidFill>
+              <a:schemeClr val="accent1"/>
+            </a:solidFill>
+          </a:ln>
+        </p:spPr>
+        <p:txBody>
+          <a:bodyPr lIns="45719" rIns="45719"/>
+          <a:lstStyle/>
+          <a:p>
+            <a:endParaRPr/>
+          </a:p>
+        </p:txBody>
+      </p:sp>
+      <p:sp>
+        <p:nvSpPr>
+          <p:cNvPr id="5" name="Freeform 4">
+            <a:extLst>
+              <a:ext uri="{FF2B5EF4-FFF2-40B4-BE49-F238E27FC236}">
+                <a16:creationId xmlns:a16="http://schemas.microsoft.com/office/drawing/2014/main" id="{B249E645-8770-144F-A0A7-C4611E068BDE}"/>
+              </a:ext>
+            </a:extLst>
+          </p:cNvPr>
+          <p:cNvSpPr/>
+          <p:nvPr/>
+        </p:nvSpPr>
+        <p:spPr bwMode="auto">
+          <a:xfrm>
+            <a:off x="2214275" y="4700437"/>
+            <a:ext cx="6943725" cy="800100"/>
+          </a:xfrm>
+          <a:custGeom>
+            <a:avLst/>
+            <a:gdLst>
+              <a:gd name="connsiteX0" fmla="*/ 0 w 6943725"/>
+              <a:gd name="connsiteY0" fmla="*/ 0 h 800100"/>
+              <a:gd name="connsiteX1" fmla="*/ 6943725 w 6943725"/>
+              <a:gd name="connsiteY1" fmla="*/ 800100 h 800100"/>
+              <a:gd name="connsiteX2" fmla="*/ 6943725 w 6943725"/>
+              <a:gd name="connsiteY2" fmla="*/ 800100 h 800100"/>
+              <a:gd name="connsiteX0" fmla="*/ 0 w 6943725"/>
+              <a:gd name="connsiteY0" fmla="*/ 0 h 800100"/>
+              <a:gd name="connsiteX1" fmla="*/ 5202920 w 6943725"/>
+              <a:gd name="connsiteY1" fmla="*/ 172175 h 800100"/>
+              <a:gd name="connsiteX2" fmla="*/ 6943725 w 6943725"/>
+              <a:gd name="connsiteY2" fmla="*/ 800100 h 800100"/>
+              <a:gd name="connsiteX3" fmla="*/ 6943725 w 6943725"/>
+              <a:gd name="connsiteY3" fmla="*/ 800100 h 800100"/>
+            </a:gdLst>
+            <a:ahLst/>
+            <a:cxnLst>
+              <a:cxn ang="0">
+                <a:pos x="connsiteX0" y="connsiteY0"/>
+              </a:cxn>
+              <a:cxn ang="0">
+                <a:pos x="connsiteX1" y="connsiteY1"/>
+              </a:cxn>
+              <a:cxn ang="0">
+                <a:pos x="connsiteX2" y="connsiteY2"/>
+              </a:cxn>
+              <a:cxn ang="0">
+                <a:pos x="connsiteX3" y="connsiteY3"/>
+              </a:cxn>
+            </a:cxnLst>
+            <a:rect l="l" t="t" r="r" b="b"/>
+            <a:pathLst>
+              <a:path w="6943725" h="800100">
+                <a:moveTo>
+                  <a:pt x="0" y="0"/>
+                </a:moveTo>
+                <a:cubicBezTo>
+                  <a:pt x="1177094" y="133592"/>
+                  <a:pt x="4025826" y="38583"/>
+                  <a:pt x="5202920" y="172175"/>
+                </a:cubicBezTo>
+                <a:lnTo>
+                  <a:pt x="6943725" y="800100"/>
+                </a:lnTo>
+                <a:lnTo>
+                  <a:pt x="6943725" y="800100"/>
+                </a:lnTo>
+              </a:path>
+            </a:pathLst>
+          </a:custGeom>
+          <a:noFill/>
+          <a:ln w="127000" cap="flat" cmpd="sng" algn="ctr">
+            <a:solidFill>
+              <a:srgbClr val="ECA180"/>
+            </a:solidFill>
+            <a:prstDash val="solid"/>
+            <a:round/>
+            <a:headEnd type="none" w="med" len="med"/>
+            <a:tailEnd type="none" w="med" len="med"/>
+          </a:ln>
+          <a:effectLst/>
+        </p:spPr>
+        <p:txBody>
+          <a:bodyPr rtlCol="0" anchor="ctr"/>
+          <a:lstStyle/>
+          <a:p>
+            <a:pPr algn="ctr"/>
+            <a:endParaRPr lang="en-GB"/>
+          </a:p>
+        </p:txBody>
+      </p:sp>
+    </p:spTree>
+    <p:extLst>
+      <p:ext uri="{BB962C8B-B14F-4D97-AF65-F5344CB8AC3E}">
+        <p14:creationId xmlns:p14="http://schemas.microsoft.com/office/powerpoint/2010/main" val="849425923"/>
+      </p:ext>
+    </p:extLst>
+  </p:cSld>
+  <p:clrMapOvr>
+    <a:masterClrMapping/>
+  </p:clrMapOvr>
+  <p:transition spd="med"/>
+</p:sld>
+</file>
+
+<file path=ppt/slides/slide9.xml><?xml version="1.0" encoding="utf-8"?>
+<p:sld xmlns:a="http://schemas.openxmlformats.org/drawingml/2006/main" xmlns:r="http://schemas.openxmlformats.org/officeDocument/2006/relationships" xmlns:p="http://schemas.openxmlformats.org/presentationml/2006/main">
+  <p:cSld>
+    <p:spTree>
+      <p:nvGrpSpPr>
+        <p:cNvPr id="1" name=""/>
+        <p:cNvGrpSpPr/>
+        <p:nvPr/>
+      </p:nvGrpSpPr>
+      <p:grpSpPr>
+        <a:xfrm>
+          <a:off x="0" y="0"/>
+          <a:ext cx="0" cy="0"/>
+          <a:chOff x="0" y="0"/>
+          <a:chExt cx="0" cy="0"/>
+        </a:xfrm>
+      </p:grpSpPr>
+      <p:sp>
+        <p:nvSpPr>
+          <p:cNvPr id="563" name="Title 1"/>
+          <p:cNvSpPr txBox="1">
+            <a:spLocks noGrp="1"/>
+          </p:cNvSpPr>
+          <p:nvPr>
+            <p:ph type="title"/>
+          </p:nvPr>
+        </p:nvSpPr>
+        <p:spPr>
+          <a:xfrm>
+            <a:off x="479425" y="476250"/>
+            <a:ext cx="8353426" cy="1081088"/>
+          </a:xfrm>
+          <a:prstGeom prst="rect">
+            <a:avLst/>
+          </a:prstGeom>
+        </p:spPr>
+        <p:txBody>
+          <a:bodyPr/>
+          <a:lstStyle>
+            <a:lvl1pPr defTabSz="868680">
+              <a:spcBef>
+                <a:spcPts val="200"/>
+              </a:spcBef>
+              <a:defRPr sz="3800" b="1" spc="-190"/>
+            </a:lvl1pPr>
+          </a:lstStyle>
+          <a:p>
+            <a:r>
+              <a:t>Multi-hop Chaining (aka Onion Routing)</a:t>
+            </a:r>
+          </a:p>
+        </p:txBody>
+      </p:sp>
+      <p:grpSp>
+        <p:nvGrpSpPr>
+          <p:cNvPr id="567" name="Group"/>
+          <p:cNvGrpSpPr/>
+          <p:nvPr/>
+        </p:nvGrpSpPr>
+        <p:grpSpPr>
+          <a:xfrm rot="20218945">
+            <a:off x="2076371" y="3897994"/>
+            <a:ext cx="1994703" cy="666702"/>
+            <a:chOff x="0" y="0"/>
+            <a:chExt cx="1994701" cy="666700"/>
+          </a:xfrm>
+        </p:grpSpPr>
+        <p:sp>
+          <p:nvSpPr>
+            <p:cNvPr id="564" name="Rectangle"/>
+            <p:cNvSpPr/>
+            <p:nvPr/>
+          </p:nvSpPr>
+          <p:spPr>
+            <a:xfrm>
+              <a:off x="72126" y="0"/>
+              <a:ext cx="1841055" cy="666701"/>
+            </a:xfrm>
+            <a:prstGeom prst="rect">
+              <a:avLst/>
+            </a:prstGeom>
+            <a:solidFill>
+              <a:srgbClr val="3980E8"/>
+            </a:solidFill>
+            <a:ln w="12700" cap="flat">
+              <a:noFill/>
+              <a:miter lim="400000"/>
+            </a:ln>
+            <a:effectLst/>
+          </p:spPr>
+          <p:txBody>
+            <a:bodyPr wrap="square" lIns="36000" tIns="36000" rIns="36000" bIns="36000" numCol="1" anchor="t">
+              <a:noAutofit/>
+            </a:bodyPr>
+            <a:lstStyle/>
+            <a:p>
+              <a:endParaRPr/>
+            </a:p>
+          </p:txBody>
+        </p:sp>
+        <p:sp>
+          <p:nvSpPr>
+            <p:cNvPr id="565" name="Oval"/>
+            <p:cNvSpPr/>
+            <p:nvPr/>
+          </p:nvSpPr>
+          <p:spPr>
+            <a:xfrm>
+              <a:off x="1824700" y="0"/>
+              <a:ext cx="170002" cy="666701"/>
+            </a:xfrm>
+            <a:prstGeom prst="ellipse">
+              <a:avLst/>
+            </a:prstGeom>
+            <a:solidFill>
+              <a:srgbClr val="3980E8"/>
+            </a:solidFill>
+            <a:ln w="12700" cap="flat">
+              <a:noFill/>
+              <a:miter lim="400000"/>
+            </a:ln>
+            <a:effectLst/>
+          </p:spPr>
+          <p:txBody>
+            <a:bodyPr wrap="square" lIns="36000" tIns="36000" rIns="36000" bIns="36000" numCol="1" anchor="t">
+              <a:noAutofit/>
+            </a:bodyPr>
+            <a:lstStyle/>
+            <a:p>
+              <a:endParaRPr/>
+            </a:p>
+          </p:txBody>
+        </p:sp>
+        <p:sp>
+          <p:nvSpPr>
+            <p:cNvPr id="566" name="Oval"/>
+            <p:cNvSpPr/>
+            <p:nvPr/>
+          </p:nvSpPr>
+          <p:spPr>
+            <a:xfrm>
+              <a:off x="0" y="0"/>
+              <a:ext cx="170002" cy="666701"/>
+            </a:xfrm>
+            <a:prstGeom prst="ellipse">
+              <a:avLst/>
+            </a:prstGeom>
+            <a:solidFill>
+              <a:srgbClr val="FFFFFF"/>
+            </a:solidFill>
+            <a:ln w="12700" cap="flat">
+              <a:noFill/>
+              <a:miter lim="400000"/>
+            </a:ln>
+            <a:effectLst/>
+          </p:spPr>
+          <p:txBody>
+            <a:bodyPr wrap="square" lIns="36000" tIns="36000" rIns="36000" bIns="36000" numCol="1" anchor="t">
+              <a:noAutofit/>
+            </a:bodyPr>
+            <a:lstStyle/>
+            <a:p>
+              <a:endParaRPr/>
+            </a:p>
+          </p:txBody>
+        </p:sp>
+      </p:grpSp>
+      <p:sp>
+        <p:nvSpPr>
+          <p:cNvPr id="568" name="Notebook"/>
+          <p:cNvSpPr/>
+          <p:nvPr/>
+        </p:nvSpPr>
+        <p:spPr>
+          <a:xfrm>
+            <a:off x="900084" y="4543350"/>
+            <a:ext cx="1508171" cy="844822"/>
+          </a:xfrm>
+          <a:custGeom>
+            <a:avLst/>
+            <a:gdLst/>
+            <a:ahLst/>
+            <a:cxnLst>
+              <a:cxn ang="0">
+                <a:pos x="wd2" y="hd2"/>
+              </a:cxn>
+              <a:cxn ang="5400000">
+                <a:pos x="wd2" y="hd2"/>
+              </a:cxn>
+              <a:cxn ang="10800000">
+                <a:pos x="wd2" y="hd2"/>
+              </a:cxn>
+              <a:cxn ang="16200000">
+                <a:pos x="wd2" y="hd2"/>
+              </a:cxn>
+            </a:cxnLst>
+            <a:rect l="0" t="0" r="r" b="b"/>
+            <a:pathLst>
+              <a:path w="21600" h="21599" extrusionOk="0">
+                <a:moveTo>
+                  <a:pt x="1952" y="0"/>
+                </a:moveTo>
+                <a:cubicBezTo>
+                  <a:pt x="1421" y="0"/>
+                  <a:pt x="1439" y="771"/>
+                  <a:pt x="1439" y="1718"/>
+                </a:cubicBezTo>
+                <a:lnTo>
+                  <a:pt x="1439" y="19328"/>
+                </a:lnTo>
+                <a:lnTo>
+                  <a:pt x="0" y="19328"/>
+                </a:lnTo>
+                <a:cubicBezTo>
+                  <a:pt x="0" y="19328"/>
+                  <a:pt x="0" y="19890"/>
+                  <a:pt x="0" y="20529"/>
+                </a:cubicBezTo>
+                <a:cubicBezTo>
+                  <a:pt x="0" y="21600"/>
+                  <a:pt x="190" y="21599"/>
+                  <a:pt x="896" y="21599"/>
+                </a:cubicBezTo>
+                <a:lnTo>
+                  <a:pt x="10332" y="21599"/>
+                </a:lnTo>
+                <a:lnTo>
+                  <a:pt x="11268" y="21599"/>
+                </a:lnTo>
+                <a:lnTo>
+                  <a:pt x="20704" y="21599"/>
+                </a:lnTo>
+                <a:cubicBezTo>
+                  <a:pt x="21367" y="21599"/>
+                  <a:pt x="21600" y="21600"/>
+                  <a:pt x="21600" y="20529"/>
+                </a:cubicBezTo>
+                <a:cubicBezTo>
+                  <a:pt x="21600" y="19890"/>
+                  <a:pt x="21600" y="19328"/>
+                  <a:pt x="21600" y="19328"/>
+                </a:cubicBezTo>
+                <a:lnTo>
+                  <a:pt x="20161" y="19328"/>
+                </a:lnTo>
+                <a:lnTo>
+                  <a:pt x="20161" y="1718"/>
+                </a:lnTo>
+                <a:cubicBezTo>
+                  <a:pt x="20161" y="771"/>
+                  <a:pt x="20196" y="0"/>
+                  <a:pt x="19665" y="0"/>
+                </a:cubicBezTo>
+                <a:lnTo>
+                  <a:pt x="1952" y="0"/>
+                </a:lnTo>
+                <a:close/>
+                <a:moveTo>
+                  <a:pt x="2475" y="1849"/>
+                </a:moveTo>
+                <a:lnTo>
+                  <a:pt x="19125" y="1849"/>
+                </a:lnTo>
+                <a:lnTo>
+                  <a:pt x="19125" y="19328"/>
+                </a:lnTo>
+                <a:lnTo>
+                  <a:pt x="11268" y="19328"/>
+                </a:lnTo>
+                <a:lnTo>
+                  <a:pt x="10332" y="19328"/>
+                </a:lnTo>
+                <a:lnTo>
+                  <a:pt x="2475" y="19328"/>
+                </a:lnTo>
+                <a:lnTo>
+                  <a:pt x="2475" y="1849"/>
+                </a:lnTo>
+                <a:close/>
+              </a:path>
+            </a:pathLst>
+          </a:custGeom>
+          <a:solidFill>
+            <a:srgbClr val="FFFFFF"/>
+          </a:solidFill>
+          <a:ln w="25400">
+            <a:solidFill>
+              <a:schemeClr val="accent1"/>
+            </a:solidFill>
+          </a:ln>
+        </p:spPr>
+        <p:txBody>
+          <a:bodyPr lIns="36000" tIns="36000" rIns="36000" bIns="36000"/>
+          <a:lstStyle/>
+          <a:p>
+            <a:endParaRPr/>
+          </a:p>
+        </p:txBody>
+      </p:sp>
+      <p:sp>
+        <p:nvSpPr>
+          <p:cNvPr id="569" name="Node"/>
+          <p:cNvSpPr/>
+          <p:nvPr/>
+        </p:nvSpPr>
+        <p:spPr>
+          <a:xfrm>
+            <a:off x="4099557" y="3160730"/>
+            <a:ext cx="1271957" cy="968449"/>
+          </a:xfrm>
+          <a:prstGeom prst="roundRect">
+            <a:avLst>
+              <a:gd name="adj" fmla="val 19701"/>
+            </a:avLst>
+          </a:prstGeom>
+          <a:solidFill>
+            <a:srgbClr val="FFFFFF"/>
+          </a:solidFill>
+          <a:ln w="25400">
+            <a:solidFill>
+              <a:schemeClr val="accent1"/>
+            </a:solidFill>
+          </a:ln>
+          <a:extLst>
+            <a:ext uri="{C572A759-6A51-4108-AA02-DFA0A04FC94B}">
+              <ma14:wrappingTextBoxFlag xmlns:ma14="http://schemas.microsoft.com/office/mac/drawingml/2011/main" xmlns:a14="http://schemas.microsoft.com/office/drawing/2010/main" xmlns:m="http://schemas.openxmlformats.org/officeDocument/2006/math" xmlns="" val="1"/>
+            </a:ext>
+          </a:extLst>
+        </p:spPr>
+        <p:txBody>
+          <a:bodyPr lIns="36000" tIns="36000" rIns="36000" bIns="36000" anchor="ctr"/>
+          <a:lstStyle>
+            <a:lvl1pPr algn="ctr"/>
+          </a:lstStyle>
+          <a:p>
+            <a:r>
+              <a:t>Node</a:t>
+            </a:r>
+          </a:p>
+        </p:txBody>
+      </p:sp>
+      <p:grpSp>
+        <p:nvGrpSpPr>
+          <p:cNvPr id="573" name="Group"/>
+          <p:cNvGrpSpPr/>
+          <p:nvPr/>
+        </p:nvGrpSpPr>
+        <p:grpSpPr>
+          <a:xfrm>
+            <a:off x="5376130" y="3311604"/>
+            <a:ext cx="1946712" cy="666701"/>
+            <a:chOff x="0" y="0"/>
+            <a:chExt cx="1946710" cy="666700"/>
+          </a:xfrm>
+        </p:grpSpPr>
+        <p:sp>
+          <p:nvSpPr>
+            <p:cNvPr id="570" name="Rectangle"/>
+            <p:cNvSpPr/>
+            <p:nvPr/>
+          </p:nvSpPr>
+          <p:spPr>
+            <a:xfrm>
+              <a:off x="70390" y="0"/>
+              <a:ext cx="1796761" cy="666701"/>
+            </a:xfrm>
+            <a:prstGeom prst="rect">
+              <a:avLst/>
+            </a:prstGeom>
+            <a:solidFill>
+              <a:srgbClr val="3980E8"/>
+            </a:solidFill>
+            <a:ln w="12700" cap="flat">
+              <a:noFill/>
+              <a:miter lim="400000"/>
+            </a:ln>
+            <a:effectLst/>
+          </p:spPr>
+          <p:txBody>
+            <a:bodyPr wrap="square" lIns="36000" tIns="36000" rIns="36000" bIns="36000" numCol="1" anchor="t">
+              <a:noAutofit/>
+            </a:bodyPr>
+            <a:lstStyle/>
+            <a:p>
+              <a:endParaRPr/>
+            </a:p>
+          </p:txBody>
+        </p:sp>
+        <p:sp>
+          <p:nvSpPr>
+            <p:cNvPr id="571" name="Oval"/>
+            <p:cNvSpPr/>
+            <p:nvPr/>
+          </p:nvSpPr>
+          <p:spPr>
+            <a:xfrm>
+              <a:off x="1780799" y="0"/>
+              <a:ext cx="165912" cy="666701"/>
+            </a:xfrm>
+            <a:prstGeom prst="ellipse">
+              <a:avLst/>
+            </a:prstGeom>
+            <a:solidFill>
+              <a:srgbClr val="3980E8"/>
+            </a:solidFill>
+            <a:ln w="12700" cap="flat">
+              <a:noFill/>
+              <a:miter lim="400000"/>
+            </a:ln>
+            <a:effectLst/>
+          </p:spPr>
+          <p:txBody>
+            <a:bodyPr wrap="square" lIns="36000" tIns="36000" rIns="36000" bIns="36000" numCol="1" anchor="t">
+              <a:noAutofit/>
+            </a:bodyPr>
+            <a:lstStyle/>
+            <a:p>
+              <a:endParaRPr/>
+            </a:p>
+          </p:txBody>
+        </p:sp>
+        <p:sp>
+          <p:nvSpPr>
+            <p:cNvPr id="572" name="Oval"/>
+            <p:cNvSpPr/>
+            <p:nvPr/>
+          </p:nvSpPr>
+          <p:spPr>
+            <a:xfrm>
+              <a:off x="0" y="0"/>
+              <a:ext cx="165912" cy="666701"/>
+            </a:xfrm>
+            <a:prstGeom prst="ellipse">
+              <a:avLst/>
+            </a:prstGeom>
+            <a:solidFill>
+              <a:srgbClr val="FFFFFF"/>
+            </a:solidFill>
+            <a:ln w="12700" cap="flat">
+              <a:noFill/>
+              <a:miter lim="400000"/>
+            </a:ln>
+            <a:effectLst/>
+          </p:spPr>
+          <p:txBody>
+            <a:bodyPr wrap="square" lIns="36000" tIns="36000" rIns="36000" bIns="36000" numCol="1" anchor="t">
+              <a:noAutofit/>
+            </a:bodyPr>
+            <a:lstStyle/>
+            <a:p>
+              <a:endParaRPr/>
+            </a:p>
+          </p:txBody>
+        </p:sp>
+      </p:grpSp>
+      <p:sp>
+        <p:nvSpPr>
+          <p:cNvPr id="574" name="Node"/>
+          <p:cNvSpPr/>
+          <p:nvPr/>
+        </p:nvSpPr>
+        <p:spPr>
+          <a:xfrm>
+            <a:off x="7427600" y="3160730"/>
+            <a:ext cx="1271957" cy="968449"/>
+          </a:xfrm>
+          <a:prstGeom prst="roundRect">
+            <a:avLst>
+              <a:gd name="adj" fmla="val 19701"/>
+            </a:avLst>
+          </a:prstGeom>
+          <a:solidFill>
+            <a:srgbClr val="FFFFFF"/>
+          </a:solidFill>
+          <a:ln w="25400">
+            <a:solidFill>
+              <a:schemeClr val="accent1"/>
+            </a:solidFill>
+          </a:ln>
+          <a:extLst>
+            <a:ext uri="{C572A759-6A51-4108-AA02-DFA0A04FC94B}">
+              <ma14:wrappingTextBoxFlag xmlns:ma14="http://schemas.microsoft.com/office/mac/drawingml/2011/main" xmlns:a14="http://schemas.microsoft.com/office/drawing/2010/main" xmlns:m="http://schemas.openxmlformats.org/officeDocument/2006/math" xmlns="" val="1"/>
+            </a:ext>
+          </a:extLst>
+        </p:spPr>
+        <p:txBody>
+          <a:bodyPr lIns="36000" tIns="36000" rIns="36000" bIns="36000" anchor="ctr"/>
+          <a:lstStyle>
+            <a:lvl1pPr algn="ctr"/>
+          </a:lstStyle>
+          <a:p>
+            <a:r>
+              <a:t>Node</a:t>
+            </a:r>
+          </a:p>
+        </p:txBody>
+      </p:sp>
+      <p:grpSp>
+        <p:nvGrpSpPr>
+          <p:cNvPr id="578" name="Group"/>
+          <p:cNvGrpSpPr/>
+          <p:nvPr/>
+        </p:nvGrpSpPr>
+        <p:grpSpPr>
+          <a:xfrm rot="1297419">
+            <a:off x="8709076" y="3728182"/>
+            <a:ext cx="1291797" cy="666701"/>
+            <a:chOff x="0" y="0"/>
+            <a:chExt cx="1291795" cy="666700"/>
+          </a:xfrm>
+        </p:grpSpPr>
+        <p:sp>
+          <p:nvSpPr>
+            <p:cNvPr id="575" name="Rectangle"/>
+            <p:cNvSpPr/>
+            <p:nvPr/>
+          </p:nvSpPr>
+          <p:spPr>
+            <a:xfrm>
+              <a:off x="46709" y="0"/>
+              <a:ext cx="1192293" cy="666701"/>
+            </a:xfrm>
+            <a:prstGeom prst="rect">
+              <a:avLst/>
+            </a:prstGeom>
+            <a:solidFill>
+              <a:srgbClr val="3980E8"/>
+            </a:solidFill>
+            <a:ln w="12700" cap="flat">
+              <a:noFill/>
+              <a:miter lim="400000"/>
+            </a:ln>
+            <a:effectLst/>
+          </p:spPr>
+          <p:txBody>
+            <a:bodyPr wrap="square" lIns="36000" tIns="36000" rIns="36000" bIns="36000" numCol="1" anchor="t">
+              <a:noAutofit/>
+            </a:bodyPr>
+            <a:lstStyle/>
+            <a:p>
+              <a:endParaRPr/>
+            </a:p>
+          </p:txBody>
+        </p:sp>
+        <p:sp>
+          <p:nvSpPr>
+            <p:cNvPr id="576" name="Oval"/>
+            <p:cNvSpPr/>
+            <p:nvPr/>
+          </p:nvSpPr>
+          <p:spPr>
+            <a:xfrm>
+              <a:off x="1181700" y="0"/>
+              <a:ext cx="110096" cy="666701"/>
+            </a:xfrm>
+            <a:prstGeom prst="ellipse">
+              <a:avLst/>
+            </a:prstGeom>
+            <a:solidFill>
+              <a:srgbClr val="3980E8"/>
+            </a:solidFill>
+            <a:ln w="12700" cap="flat">
+              <a:noFill/>
+              <a:miter lim="400000"/>
+            </a:ln>
+            <a:effectLst/>
+          </p:spPr>
+          <p:txBody>
+            <a:bodyPr wrap="square" lIns="36000" tIns="36000" rIns="36000" bIns="36000" numCol="1" anchor="t">
+              <a:noAutofit/>
+            </a:bodyPr>
+            <a:lstStyle/>
+            <a:p>
+              <a:endParaRPr/>
+            </a:p>
+          </p:txBody>
+        </p:sp>
+        <p:sp>
+          <p:nvSpPr>
+            <p:cNvPr id="577" name="Oval"/>
+            <p:cNvSpPr/>
+            <p:nvPr/>
+          </p:nvSpPr>
+          <p:spPr>
+            <a:xfrm>
+              <a:off x="0" y="0"/>
+              <a:ext cx="110096" cy="666701"/>
+            </a:xfrm>
+            <a:prstGeom prst="ellipse">
+              <a:avLst/>
+            </a:prstGeom>
+            <a:solidFill>
+              <a:srgbClr val="FFFFFF"/>
+            </a:solidFill>
+            <a:ln w="12700" cap="flat">
+              <a:noFill/>
+              <a:miter lim="400000"/>
+            </a:ln>
+            <a:effectLst/>
+          </p:spPr>
+          <p:txBody>
+            <a:bodyPr wrap="square" lIns="36000" tIns="36000" rIns="36000" bIns="36000" numCol="1" anchor="t">
+              <a:noAutofit/>
+            </a:bodyPr>
+            <a:lstStyle/>
+            <a:p>
+              <a:endParaRPr/>
+            </a:p>
+          </p:txBody>
+        </p:sp>
+      </p:grpSp>
+      <p:sp>
+        <p:nvSpPr>
+          <p:cNvPr id="579" name="Server"/>
+          <p:cNvSpPr/>
+          <p:nvPr/>
+        </p:nvSpPr>
+        <p:spPr>
+          <a:xfrm>
+            <a:off x="10067375" y="3946090"/>
+            <a:ext cx="1271956" cy="2039342"/>
+          </a:xfrm>
+          <a:prstGeom prst="roundRect">
+            <a:avLst>
+              <a:gd name="adj" fmla="val 15000"/>
+            </a:avLst>
+          </a:prstGeom>
+          <a:solidFill>
+            <a:srgbClr val="FFFFFF"/>
+          </a:solidFill>
+          <a:ln w="25400">
+            <a:solidFill>
+              <a:schemeClr val="accent1"/>
+            </a:solidFill>
+          </a:ln>
+          <a:extLst>
+            <a:ext uri="{C572A759-6A51-4108-AA02-DFA0A04FC94B}">
+              <ma14:wrappingTextBoxFlag xmlns:ma14="http://schemas.microsoft.com/office/mac/drawingml/2011/main" xmlns:a14="http://schemas.microsoft.com/office/drawing/2010/main" xmlns:m="http://schemas.openxmlformats.org/officeDocument/2006/math" xmlns="" val="1"/>
+            </a:ext>
+          </a:extLst>
+        </p:spPr>
+        <p:txBody>
+          <a:bodyPr lIns="36000" tIns="36000" rIns="36000" bIns="36000" anchor="ctr"/>
+          <a:lstStyle>
+            <a:lvl1pPr algn="ctr"/>
+          </a:lstStyle>
+          <a:p>
+            <a:r>
+              <a:t>Server</a:t>
+            </a:r>
+          </a:p>
+        </p:txBody>
+      </p:sp>
+      <p:sp>
+        <p:nvSpPr>
+          <p:cNvPr id="581" name="Content Placeholder 2"/>
+          <p:cNvSpPr txBox="1">
+            <a:spLocks noGrp="1"/>
+          </p:cNvSpPr>
+          <p:nvPr>
+            <p:ph type="body" idx="1"/>
+          </p:nvPr>
+        </p:nvSpPr>
+        <p:spPr>
+          <a:xfrm>
+            <a:off x="479424" y="1844675"/>
+            <a:ext cx="11277148" cy="4392613"/>
+          </a:xfrm>
+          <a:prstGeom prst="rect">
+            <a:avLst/>
+          </a:prstGeom>
+        </p:spPr>
+        <p:txBody>
+          <a:bodyPr/>
+          <a:lstStyle/>
+          <a:p>
+            <a:pPr lvl="1">
+              <a:defRPr sz="1800" spc="-100"/>
+            </a:pPr>
+            <a:r>
+              <a:t>Multiple layers of QUIC tunnels can each point to another proxy, enabling TOR-like security</a:t>
+            </a:r>
+          </a:p>
+        </p:txBody>
+      </p:sp>
+      <p:sp>
+        <p:nvSpPr>
+          <p:cNvPr id="10" name="Freeform 9">
+            <a:extLst>
+              <a:ext uri="{FF2B5EF4-FFF2-40B4-BE49-F238E27FC236}">
+                <a16:creationId xmlns:a16="http://schemas.microsoft.com/office/drawing/2014/main" id="{8151C7F5-3AD2-1348-B707-5662AC013129}"/>
+              </a:ext>
+            </a:extLst>
+          </p:cNvPr>
+          <p:cNvSpPr/>
+          <p:nvPr/>
+        </p:nvSpPr>
+        <p:spPr bwMode="auto">
+          <a:xfrm>
+            <a:off x="2343150" y="3557581"/>
+            <a:ext cx="7743825" cy="1185869"/>
+          </a:xfrm>
+          <a:custGeom>
+            <a:avLst/>
+            <a:gdLst>
+              <a:gd name="connsiteX0" fmla="*/ 0 w 7743825"/>
+              <a:gd name="connsiteY0" fmla="*/ 1185869 h 1185869"/>
+              <a:gd name="connsiteX1" fmla="*/ 3786188 w 7743825"/>
+              <a:gd name="connsiteY1" fmla="*/ 7 h 1185869"/>
+              <a:gd name="connsiteX2" fmla="*/ 7743825 w 7743825"/>
+              <a:gd name="connsiteY2" fmla="*/ 1171582 h 1185869"/>
+            </a:gdLst>
+            <a:ahLst/>
+            <a:cxnLst>
+              <a:cxn ang="0">
+                <a:pos x="connsiteX0" y="connsiteY0"/>
+              </a:cxn>
+              <a:cxn ang="0">
+                <a:pos x="connsiteX1" y="connsiteY1"/>
+              </a:cxn>
+              <a:cxn ang="0">
+                <a:pos x="connsiteX2" y="connsiteY2"/>
+              </a:cxn>
+            </a:cxnLst>
+            <a:rect l="l" t="t" r="r" b="b"/>
+            <a:pathLst>
+              <a:path w="7743825" h="1185869">
+                <a:moveTo>
+                  <a:pt x="0" y="1185869"/>
+                </a:moveTo>
+                <a:cubicBezTo>
+                  <a:pt x="1247775" y="594128"/>
+                  <a:pt x="2495551" y="2388"/>
+                  <a:pt x="3786188" y="7"/>
+                </a:cubicBezTo>
+                <a:cubicBezTo>
+                  <a:pt x="5076825" y="-2374"/>
+                  <a:pt x="6410325" y="584604"/>
+                  <a:pt x="7743825" y="1171582"/>
+                </a:cubicBezTo>
+              </a:path>
+            </a:pathLst>
+          </a:custGeom>
+          <a:noFill/>
+          <a:ln w="127000" cap="flat" cmpd="sng" algn="ctr">
+            <a:solidFill>
+              <a:srgbClr val="ECA180"/>
+            </a:solidFill>
+            <a:prstDash val="solid"/>
+            <a:round/>
+            <a:headEnd type="none" w="med" len="med"/>
+            <a:tailEnd type="none" w="med" len="med"/>
+          </a:ln>
+          <a:effectLst/>
+        </p:spPr>
+        <p:txBody>
+          <a:bodyPr rtlCol="0" anchor="ctr"/>
+          <a:lstStyle/>
+          <a:p>
+            <a:pPr algn="ctr"/>
+            <a:endParaRPr lang="en-GB"/>
+          </a:p>
+        </p:txBody>
+      </p:sp>
+    </p:spTree>
+    <p:extLst>
+      <p:ext uri="{BB962C8B-B14F-4D97-AF65-F5344CB8AC3E}">
+        <p14:creationId xmlns:p14="http://schemas.microsoft.com/office/powerpoint/2010/main" val="258085232"/>
+      </p:ext>
+    </p:extLst>
+  </p:cSld>
+  <p:clrMapOvr>
+    <a:masterClrMapping/>
+  </p:clrMapOvr>
+  <p:transition spd="med"/>
 </p:sld>
 </file>
 
@@ -23706,6 +26655,21 @@
 </file>
 
 <file path=customXml/item1.xml><?xml version="1.0" encoding="utf-8"?>
+<?mso-contentType ?>
+<FormTemplates xmlns="http://schemas.microsoft.com/sharepoint/v3/contenttype/forms">
+  <Display>DocumentLibraryForm</Display>
+  <Edit>DocumentLibraryForm</Edit>
+  <New>DocumentLibraryForm</New>
+</FormTemplates>
+</file>
+
+<file path=customXml/item2.xml><?xml version="1.0" encoding="utf-8"?>
+<p:properties xmlns:p="http://schemas.microsoft.com/office/2006/metadata/properties" xmlns:xsi="http://www.w3.org/2001/XMLSchema-instance" xmlns:pc="http://schemas.microsoft.com/office/infopath/2007/PartnerControls">
+  <documentManagement/>
+</p:properties>
+</file>
+
+<file path=customXml/item3.xml><?xml version="1.0" encoding="utf-8"?>
 <ct:contentTypeSchema xmlns:ct="http://schemas.microsoft.com/office/2006/metadata/contentType" xmlns:ma="http://schemas.microsoft.com/office/2006/metadata/properties/metaAttributes" ct:_="" ma:_="" ma:contentTypeName="Document" ma:contentTypeID="0x010100C03988EFFFAD8B4CB063808EBFFE5ED8" ma:contentTypeVersion="4" ma:contentTypeDescription="Create a new document." ma:contentTypeScope="" ma:versionID="326545bdbe4a849a65846e87af1adca5">
   <xsd:schema xmlns:xsd="http://www.w3.org/2001/XMLSchema" xmlns:xs="http://www.w3.org/2001/XMLSchema" xmlns:p="http://schemas.microsoft.com/office/2006/metadata/properties" xmlns:ns2="ea2c9013-ea93-489e-bc80-8fba65eb0fde" xmlns:ns3="b854da82-ec39-4286-bd20-ffc5d329d619" targetNamespace="http://schemas.microsoft.com/office/2006/metadata/properties" ma:root="true" ma:fieldsID="860a7e03e5f7f65cf71f4c5f4c9fc92a" ns2:_="" ns3:_="">
     <xsd:import namespace="ea2c9013-ea93-489e-bc80-8fba65eb0fde"/>
@@ -23870,36 +26834,10 @@
 </ct:contentTypeSchema>
 </file>
 
-<file path=customXml/item2.xml><?xml version="1.0" encoding="utf-8"?>
-<p:properties xmlns:p="http://schemas.microsoft.com/office/2006/metadata/properties" xmlns:xsi="http://www.w3.org/2001/XMLSchema-instance" xmlns:pc="http://schemas.microsoft.com/office/infopath/2007/PartnerControls">
-  <documentManagement/>
-</p:properties>
-</file>
-
-<file path=customXml/item3.xml><?xml version="1.0" encoding="utf-8"?>
-<?mso-contentType ?>
-<FormTemplates xmlns="http://schemas.microsoft.com/sharepoint/v3/contenttype/forms">
-  <Display>DocumentLibraryForm</Display>
-  <Edit>DocumentLibraryForm</Edit>
-  <New>DocumentLibraryForm</New>
-</FormTemplates>
-</file>
-
 <file path=customXml/itemProps1.xml><?xml version="1.0" encoding="utf-8"?>
-<ds:datastoreItem xmlns:ds="http://schemas.openxmlformats.org/officeDocument/2006/customXml" ds:itemID="{301A51F6-7656-4F0A-86F3-FECF8090E1DD}">
+<ds:datastoreItem xmlns:ds="http://schemas.openxmlformats.org/officeDocument/2006/customXml" ds:itemID="{44A8D3C8-4AF7-47C4-A140-76D3AFEC3825}">
   <ds:schemaRefs>
-    <ds:schemaRef ds:uri="http://schemas.microsoft.com/office/2006/metadata/contentType"/>
-    <ds:schemaRef ds:uri="http://schemas.microsoft.com/office/2006/metadata/properties/metaAttributes"/>
-    <ds:schemaRef ds:uri="http://www.w3.org/2001/XMLSchema"/>
-    <ds:schemaRef ds:uri="http://schemas.microsoft.com/office/2006/metadata/properties"/>
-    <ds:schemaRef ds:uri="ea2c9013-ea93-489e-bc80-8fba65eb0fde"/>
-    <ds:schemaRef ds:uri="b854da82-ec39-4286-bd20-ffc5d329d619"/>
-    <ds:schemaRef ds:uri="http://schemas.microsoft.com/office/2006/documentManagement/types"/>
-    <ds:schemaRef ds:uri="http://schemas.microsoft.com/office/infopath/2007/PartnerControls"/>
-    <ds:schemaRef ds:uri="http://schemas.openxmlformats.org/package/2006/metadata/core-properties"/>
-    <ds:schemaRef ds:uri="http://purl.org/dc/elements/1.1/"/>
-    <ds:schemaRef ds:uri="http://purl.org/dc/terms/"/>
-    <ds:schemaRef ds:uri="http://schemas.microsoft.com/internal/obd"/>
+    <ds:schemaRef ds:uri="http://schemas.microsoft.com/sharepoint/v3/contenttype/forms"/>
   </ds:schemaRefs>
 </ds:datastoreItem>
 </file>
@@ -23922,9 +26860,20 @@
 </file>
 
 <file path=customXml/itemProps3.xml><?xml version="1.0" encoding="utf-8"?>
-<ds:datastoreItem xmlns:ds="http://schemas.openxmlformats.org/officeDocument/2006/customXml" ds:itemID="{44A8D3C8-4AF7-47C4-A140-76D3AFEC3825}">
+<ds:datastoreItem xmlns:ds="http://schemas.openxmlformats.org/officeDocument/2006/customXml" ds:itemID="{301A51F6-7656-4F0A-86F3-FECF8090E1DD}">
   <ds:schemaRefs>
-    <ds:schemaRef ds:uri="http://schemas.microsoft.com/sharepoint/v3/contenttype/forms"/>
+    <ds:schemaRef ds:uri="http://schemas.microsoft.com/office/2006/metadata/contentType"/>
+    <ds:schemaRef ds:uri="http://schemas.microsoft.com/office/2006/metadata/properties/metaAttributes"/>
+    <ds:schemaRef ds:uri="http://www.w3.org/2001/XMLSchema"/>
+    <ds:schemaRef ds:uri="http://schemas.microsoft.com/office/2006/metadata/properties"/>
+    <ds:schemaRef ds:uri="ea2c9013-ea93-489e-bc80-8fba65eb0fde"/>
+    <ds:schemaRef ds:uri="b854da82-ec39-4286-bd20-ffc5d329d619"/>
+    <ds:schemaRef ds:uri="http://schemas.microsoft.com/office/2006/documentManagement/types"/>
+    <ds:schemaRef ds:uri="http://schemas.microsoft.com/office/infopath/2007/PartnerControls"/>
+    <ds:schemaRef ds:uri="http://schemas.openxmlformats.org/package/2006/metadata/core-properties"/>
+    <ds:schemaRef ds:uri="http://purl.org/dc/elements/1.1/"/>
+    <ds:schemaRef ds:uri="http://purl.org/dc/terms/"/>
+    <ds:schemaRef ds:uri="http://schemas.microsoft.com/internal/obd"/>
   </ds:schemaRefs>
 </ds:datastoreItem>
 </file>
</xml_diff>